<commit_message>
Create skeleton of project to start off demo
</commit_message>
<xml_diff>
--- a/BuildingFunAPIs.pptx
+++ b/BuildingFunAPIs.pptx
@@ -5,17 +5,19 @@
     <p:sldMasterId id="2147483720" r:id="rId1"/>
   </p:sldMasterIdLst>
   <p:notesMasterIdLst>
-    <p:notesMasterId r:id="rId10"/>
+    <p:notesMasterId r:id="rId12"/>
   </p:notesMasterIdLst>
   <p:sldIdLst>
     <p:sldId id="256" r:id="rId2"/>
     <p:sldId id="258" r:id="rId3"/>
-    <p:sldId id="259" r:id="rId4"/>
-    <p:sldId id="264" r:id="rId5"/>
-    <p:sldId id="260" r:id="rId6"/>
-    <p:sldId id="263" r:id="rId7"/>
-    <p:sldId id="261" r:id="rId8"/>
-    <p:sldId id="262" r:id="rId9"/>
+    <p:sldId id="265" r:id="rId4"/>
+    <p:sldId id="259" r:id="rId5"/>
+    <p:sldId id="264" r:id="rId6"/>
+    <p:sldId id="260" r:id="rId7"/>
+    <p:sldId id="263" r:id="rId8"/>
+    <p:sldId id="266" r:id="rId9"/>
+    <p:sldId id="261" r:id="rId10"/>
+    <p:sldId id="262" r:id="rId11"/>
   </p:sldIdLst>
   <p:sldSz cx="12192000" cy="6858000"/>
   <p:notesSz cx="6858000" cy="9144000"/>
@@ -515,418 +517,7 @@
           <a:bodyPr/>
           <a:lstStyle/>
           <a:p>
-            <a:r>
-              <a:rPr lang="en-US" dirty="0"/>
-              <a:t>Pragmatic</a:t>
-            </a:r>
-          </a:p>
-          <a:p>
-            <a:pPr marL="171450" indent="-171450">
-              <a:buFont typeface="Arial" panose="020B0604020202020204" pitchFamily="34" charset="0"/>
-              <a:buChar char="•"/>
-            </a:pPr>
-            <a:r>
-              <a:rPr lang="en-US" dirty="0"/>
-              <a:t>Follows a development pattern that fits the identity of your system. If you system lends itself to RPC, don’t waste time trying to represent everything as entities and be perfectly RESTful.</a:t>
-            </a:r>
-          </a:p>
-          <a:p>
-            <a:pPr marL="171450" indent="-171450">
-              <a:buFont typeface="Arial" panose="020B0604020202020204" pitchFamily="34" charset="0"/>
-              <a:buChar char="•"/>
-            </a:pPr>
-            <a:r>
-              <a:rPr lang="en-US" dirty="0"/>
-              <a:t>You don’t need to use OAUTH/OIDC if you use sessions everywhere else.</a:t>
-            </a:r>
-          </a:p>
-          <a:p>
-            <a:pPr marL="171450" indent="-171450">
-              <a:buFont typeface="Arial" panose="020B0604020202020204" pitchFamily="34" charset="0"/>
-              <a:buChar char="•"/>
-            </a:pPr>
-            <a:r>
-              <a:rPr lang="en-US" dirty="0"/>
-              <a:t>You don’t need to use brand new tools. Use what you’re comfortable with and what your team or organization is familiar with, unless you have a really good reason not to.</a:t>
-            </a:r>
-          </a:p>
-          <a:p>
-            <a:pPr marL="171450" indent="-171450">
-              <a:buFont typeface="Arial" panose="020B0604020202020204" pitchFamily="34" charset="0"/>
-              <a:buChar char="•"/>
-            </a:pPr>
-            <a:r>
-              <a:rPr lang="en-US" dirty="0"/>
-              <a:t>You almost certainly don’t need microservices</a:t>
-            </a:r>
-          </a:p>
-          <a:p>
-            <a:pPr marL="0" indent="0">
-              <a:buFontTx/>
-              <a:buNone/>
-            </a:pPr>
-            <a:endParaRPr lang="en-US" dirty="0"/>
-          </a:p>
-          <a:p>
-            <a:pPr marL="0" indent="0">
-              <a:buFontTx/>
-              <a:buNone/>
-            </a:pPr>
-            <a:r>
-              <a:rPr lang="en-US" dirty="0"/>
-              <a:t>Consistent</a:t>
-            </a:r>
-          </a:p>
-          <a:p>
-            <a:pPr marL="171450" indent="-171450">
-              <a:buFont typeface="Arial" panose="020B0604020202020204" pitchFamily="34" charset="0"/>
-              <a:buChar char="•"/>
-            </a:pPr>
-            <a:r>
-              <a:rPr lang="en-US" dirty="0"/>
-              <a:t>Reduce the cognitive overhead of learning and consuming your API. </a:t>
-            </a:r>
-          </a:p>
-          <a:p>
-            <a:pPr marL="171450" indent="-171450">
-              <a:buFont typeface="Arial" panose="020B0604020202020204" pitchFamily="34" charset="0"/>
-              <a:buChar char="•"/>
-            </a:pPr>
-            <a:r>
-              <a:rPr lang="en-US" dirty="0"/>
-              <a:t>Uses consistent language and phrasing across the platform. Use the terms that make sense in your domain, and use them consistently across the API.</a:t>
-            </a:r>
-          </a:p>
-          <a:p>
-            <a:pPr marL="171450" indent="-171450">
-              <a:buFont typeface="Arial" panose="020B0604020202020204" pitchFamily="34" charset="0"/>
-              <a:buChar char="•"/>
-            </a:pPr>
-            <a:r>
-              <a:rPr lang="en-US" dirty="0"/>
-              <a:t>Use consistent variable names across your platform. Represent authentication information in the same way across your platform.</a:t>
-            </a:r>
-          </a:p>
-          <a:p>
-            <a:pPr marL="171450" indent="-171450">
-              <a:buFont typeface="Arial" panose="020B0604020202020204" pitchFamily="34" charset="0"/>
-              <a:buChar char="•"/>
-            </a:pPr>
-            <a:r>
-              <a:rPr lang="en-US" dirty="0"/>
-              <a:t>Form an API guidance group. Don’t cowboy things unless you have no choice</a:t>
-            </a:r>
-          </a:p>
-          <a:p>
-            <a:pPr marL="171450" indent="-171450">
-              <a:buFont typeface="Arial" panose="020B0604020202020204" pitchFamily="34" charset="0"/>
-              <a:buChar char="•"/>
-            </a:pPr>
-            <a:endParaRPr lang="en-US" dirty="0"/>
-          </a:p>
-          <a:p>
-            <a:pPr marL="0" indent="0">
-              <a:buFont typeface="Arial" panose="020B0604020202020204" pitchFamily="34" charset="0"/>
-              <a:buNone/>
-            </a:pPr>
-            <a:r>
-              <a:rPr lang="en-US" dirty="0"/>
-              <a:t>Discoverable / Documented</a:t>
-            </a:r>
-          </a:p>
-          <a:p>
-            <a:pPr marL="171450" indent="-171450">
-              <a:buFont typeface="Arial" panose="020B0604020202020204" pitchFamily="34" charset="0"/>
-              <a:buChar char="•"/>
-            </a:pPr>
-            <a:r>
-              <a:rPr lang="en-US" dirty="0"/>
-              <a:t>Internal and external</a:t>
-            </a:r>
-          </a:p>
-          <a:p>
-            <a:pPr marL="171450" indent="-171450">
-              <a:buFont typeface="Arial" panose="020B0604020202020204" pitchFamily="34" charset="0"/>
-              <a:buChar char="•"/>
-            </a:pPr>
-            <a:r>
-              <a:rPr lang="en-US" dirty="0"/>
-              <a:t>There are lots of great tools out there for exposing information about your API to the outside world. Every moment you spend on documentation will come back to help you. </a:t>
-            </a:r>
-          </a:p>
-          <a:p>
-            <a:pPr marL="171450" indent="-171450">
-              <a:buFont typeface="Arial" panose="020B0604020202020204" pitchFamily="34" charset="0"/>
-              <a:buChar char="•"/>
-            </a:pPr>
-            <a:r>
-              <a:rPr lang="en-US" dirty="0"/>
-              <a:t>APIs tend to live a long time, and you aren’t going to be able to remember why you made decisions you made.</a:t>
-            </a:r>
-          </a:p>
-          <a:p>
-            <a:pPr marL="171450" indent="-171450">
-              <a:buFont typeface="Arial" panose="020B0604020202020204" pitchFamily="34" charset="0"/>
-              <a:buChar char="•"/>
-            </a:pPr>
-            <a:r>
-              <a:rPr lang="en-US" dirty="0"/>
-              <a:t>More people read and consume your code and APIs than will ever modify them</a:t>
-            </a:r>
-          </a:p>
-          <a:p>
-            <a:pPr marL="171450" indent="-171450">
-              <a:buFont typeface="Arial" panose="020B0604020202020204" pitchFamily="34" charset="0"/>
-              <a:buChar char="•"/>
-            </a:pPr>
-            <a:r>
-              <a:rPr lang="en-US" dirty="0"/>
-              <a:t>Swagger/</a:t>
-            </a:r>
-            <a:r>
-              <a:rPr lang="en-US" dirty="0" err="1"/>
-              <a:t>OpenAPI</a:t>
-            </a:r>
-            <a:r>
-              <a:rPr lang="en-US" dirty="0"/>
-              <a:t>, GRPC, SOAP, </a:t>
-            </a:r>
-            <a:r>
-              <a:rPr lang="en-US" dirty="0" err="1"/>
-              <a:t>etc</a:t>
-            </a:r>
-            <a:r>
-              <a:rPr lang="en-US" dirty="0"/>
-              <a:t> are all valid. Yes, even SOAP.</a:t>
-            </a:r>
-          </a:p>
-          <a:p>
-            <a:pPr marL="171450" indent="-171450">
-              <a:buFont typeface="Arial" panose="020B0604020202020204" pitchFamily="34" charset="0"/>
-              <a:buChar char="•"/>
-            </a:pPr>
-            <a:r>
-              <a:rPr lang="en-US" dirty="0"/>
-              <a:t>Self documenting code is a myth.</a:t>
-            </a:r>
-          </a:p>
-          <a:p>
-            <a:pPr marL="171450" indent="-171450">
-              <a:buFont typeface="Arial" panose="020B0604020202020204" pitchFamily="34" charset="0"/>
-              <a:buChar char="•"/>
-            </a:pPr>
-            <a:endParaRPr lang="en-US" dirty="0"/>
-          </a:p>
-          <a:p>
-            <a:pPr marL="0" indent="0">
-              <a:buFont typeface="Arial" panose="020B0604020202020204" pitchFamily="34" charset="0"/>
-              <a:buNone/>
-            </a:pPr>
-            <a:r>
-              <a:rPr lang="en-US" dirty="0"/>
-              <a:t>Interactive and testable</a:t>
-            </a:r>
-          </a:p>
-          <a:p>
-            <a:pPr marL="171450" indent="-171450">
-              <a:buFont typeface="Arial" panose="020B0604020202020204" pitchFamily="34" charset="0"/>
-              <a:buChar char="•"/>
-            </a:pPr>
-            <a:r>
-              <a:rPr lang="en-US" dirty="0"/>
-              <a:t>Provide a sandbox. Don’t just provide the API, provide a low-effort way for a consumer to manage test data and consume the API without worrying about accidentally disclosing test data.</a:t>
-            </a:r>
-          </a:p>
-          <a:p>
-            <a:pPr marL="171450" indent="-171450">
-              <a:buFont typeface="Arial" panose="020B0604020202020204" pitchFamily="34" charset="0"/>
-              <a:buChar char="•"/>
-            </a:pPr>
-            <a:r>
-              <a:rPr lang="en-US" dirty="0"/>
-              <a:t>Make the sandbox interactive. Provide tooling/SDKs to go along with the API. </a:t>
-            </a:r>
-          </a:p>
-          <a:p>
-            <a:pPr marL="171450" indent="-171450">
-              <a:buFont typeface="Arial" panose="020B0604020202020204" pitchFamily="34" charset="0"/>
-              <a:buChar char="•"/>
-            </a:pPr>
-            <a:r>
-              <a:rPr lang="en-US" dirty="0"/>
-              <a:t>Have ways to simulate errors, provide immediate feedback on errors, have traffic inspection in your API</a:t>
-            </a:r>
-          </a:p>
-          <a:p>
-            <a:pPr marL="171450" indent="-171450">
-              <a:buFont typeface="Arial" panose="020B0604020202020204" pitchFamily="34" charset="0"/>
-              <a:buChar char="•"/>
-            </a:pPr>
-            <a:r>
-              <a:rPr lang="en-US" dirty="0"/>
-              <a:t>Provide a way to test at least common scenarios in your API, and make them obvious</a:t>
-            </a:r>
-          </a:p>
-          <a:p>
-            <a:pPr marL="171450" indent="-171450">
-              <a:buFont typeface="Arial" panose="020B0604020202020204" pitchFamily="34" charset="0"/>
-              <a:buChar char="•"/>
-            </a:pPr>
-            <a:r>
-              <a:rPr lang="en-US" dirty="0"/>
-              <a:t>Unit tests are great. 100% test coverage is a zero sum game.</a:t>
-            </a:r>
-          </a:p>
-          <a:p>
-            <a:pPr marL="171450" indent="-171450">
-              <a:buFont typeface="Arial" panose="020B0604020202020204" pitchFamily="34" charset="0"/>
-              <a:buChar char="•"/>
-            </a:pPr>
-            <a:endParaRPr lang="en-US" dirty="0"/>
-          </a:p>
-          <a:p>
-            <a:pPr marL="0" indent="0">
-              <a:buFont typeface="Arial" panose="020B0604020202020204" pitchFamily="34" charset="0"/>
-              <a:buNone/>
-            </a:pPr>
-            <a:r>
-              <a:rPr lang="en-US" dirty="0"/>
-              <a:t>Monitored and </a:t>
-            </a:r>
-            <a:r>
-              <a:rPr lang="en-US" dirty="0" err="1"/>
-              <a:t>debuggable</a:t>
-            </a:r>
-            <a:endParaRPr lang="en-US" dirty="0"/>
-          </a:p>
-          <a:p>
-            <a:pPr marL="171450" indent="-171450">
-              <a:buFont typeface="Arial" panose="020B0604020202020204" pitchFamily="34" charset="0"/>
-              <a:buChar char="•"/>
-            </a:pPr>
-            <a:r>
-              <a:rPr lang="en-US" dirty="0"/>
-              <a:t>Think about operations early. Build in points to track metrics, failures, runtime events.</a:t>
-            </a:r>
-          </a:p>
-          <a:p>
-            <a:pPr marL="171450" indent="-171450">
-              <a:buFont typeface="Arial" panose="020B0604020202020204" pitchFamily="34" charset="0"/>
-              <a:buChar char="•"/>
-            </a:pPr>
-            <a:r>
-              <a:rPr lang="en-US" dirty="0"/>
-              <a:t>Think about logging early. Structured logging is absolutely fantastic.</a:t>
-            </a:r>
-          </a:p>
-          <a:p>
-            <a:pPr marL="171450" indent="-171450">
-              <a:buFont typeface="Arial" panose="020B0604020202020204" pitchFamily="34" charset="0"/>
-              <a:buChar char="•"/>
-            </a:pPr>
-            <a:r>
-              <a:rPr lang="en-US" dirty="0"/>
-              <a:t>What can you log and what can’t you log? What kind of masking do you need to apply? Don’t be </a:t>
-            </a:r>
-            <a:r>
-              <a:rPr lang="en-US" dirty="0" err="1"/>
-              <a:t>facebook</a:t>
-            </a:r>
-            <a:endParaRPr lang="en-US" dirty="0"/>
-          </a:p>
-          <a:p>
-            <a:pPr marL="171450" indent="-171450">
-              <a:buFont typeface="Arial" panose="020B0604020202020204" pitchFamily="34" charset="0"/>
-              <a:buChar char="•"/>
-            </a:pPr>
-            <a:r>
-              <a:rPr lang="en-US" dirty="0"/>
-              <a:t>Choose analytics tools. If you can avoid it, don’t tie yourself directly to a certain tool, but define an application-specific abstraction and implement it for a given tool.</a:t>
-            </a:r>
-          </a:p>
-          <a:p>
-            <a:pPr marL="171450" indent="-171450">
-              <a:buFont typeface="Arial" panose="020B0604020202020204" pitchFamily="34" charset="0"/>
-              <a:buChar char="•"/>
-            </a:pPr>
-            <a:endParaRPr lang="en-US" dirty="0"/>
-          </a:p>
-          <a:p>
-            <a:pPr marL="0" indent="0">
-              <a:buFont typeface="Arial" panose="020B0604020202020204" pitchFamily="34" charset="0"/>
-              <a:buNone/>
-            </a:pPr>
-            <a:r>
-              <a:rPr lang="en-US" dirty="0"/>
-              <a:t>Deployable</a:t>
-            </a:r>
-          </a:p>
-          <a:p>
-            <a:pPr marL="171450" indent="-171450">
-              <a:buFont typeface="Arial" panose="020B0604020202020204" pitchFamily="34" charset="0"/>
-              <a:buChar char="•"/>
-            </a:pPr>
-            <a:r>
-              <a:rPr lang="en-US" dirty="0"/>
-              <a:t>To dev, testing/QA and production, builds and deployments should be as fast and one-touch as possible.</a:t>
-            </a:r>
-          </a:p>
-          <a:p>
-            <a:pPr marL="171450" indent="-171450">
-              <a:buFont typeface="Arial" panose="020B0604020202020204" pitchFamily="34" charset="0"/>
-              <a:buChar char="•"/>
-            </a:pPr>
-            <a:r>
-              <a:rPr lang="en-US" dirty="0"/>
-              <a:t>Unit/integration tests should be runnable at all stages</a:t>
-            </a:r>
-          </a:p>
-          <a:p>
-            <a:pPr marL="171450" indent="-171450">
-              <a:buFont typeface="Arial" panose="020B0604020202020204" pitchFamily="34" charset="0"/>
-              <a:buChar char="•"/>
-            </a:pPr>
-            <a:r>
-              <a:rPr lang="en-US" dirty="0"/>
-              <a:t>If it’s possible for it to “works on my machine”, you have work to do</a:t>
-            </a:r>
-          </a:p>
-          <a:p>
-            <a:pPr marL="171450" indent="-171450">
-              <a:buFont typeface="Arial" panose="020B0604020202020204" pitchFamily="34" charset="0"/>
-              <a:buChar char="•"/>
-            </a:pPr>
-            <a:endParaRPr lang="en-US" dirty="0"/>
-          </a:p>
-          <a:p>
-            <a:pPr marL="0" indent="0">
-              <a:buFont typeface="Arial" panose="020B0604020202020204" pitchFamily="34" charset="0"/>
-              <a:buNone/>
-            </a:pPr>
-            <a:r>
-              <a:rPr lang="en-US" dirty="0"/>
-              <a:t>Changeable</a:t>
-            </a:r>
-          </a:p>
-          <a:p>
-            <a:pPr marL="171450" indent="-171450">
-              <a:buFont typeface="Arial" panose="020B0604020202020204" pitchFamily="34" charset="0"/>
-              <a:buChar char="•"/>
-            </a:pPr>
-            <a:r>
-              <a:rPr lang="en-US" dirty="0"/>
-              <a:t>Bringing a new dev online should be a few-day process at most. If it takes longer than that, or you can’t fit the whole thing in one persons head, it probably isn’t factored correctly</a:t>
-            </a:r>
-          </a:p>
-          <a:p>
-            <a:pPr marL="171450" indent="-171450">
-              <a:buFont typeface="Arial" panose="020B0604020202020204" pitchFamily="34" charset="0"/>
-              <a:buChar char="•"/>
-            </a:pPr>
-            <a:r>
-              <a:rPr lang="en-US" dirty="0"/>
-              <a:t>Features should be orthogonal. You should be able to trust that if you make a change in one location, you won’t break another feature</a:t>
-            </a:r>
+            <a:endParaRPr lang="en-US"/>
           </a:p>
         </p:txBody>
       </p:sp>
@@ -947,7 +538,7 @@
           <a:p>
             <a:fld id="{14F76762-4E4C-4BAC-B1C4-75C6B3E0A9B1}" type="slidenum">
               <a:rPr lang="en-US" smtClean="0"/>
-              <a:t>3</a:t>
+              <a:t>1</a:t>
             </a:fld>
             <a:endParaRPr lang="en-US"/>
           </a:p>
@@ -956,7 +547,7 @@
     </p:spTree>
     <p:extLst>
       <p:ext uri="{BB962C8B-B14F-4D97-AF65-F5344CB8AC3E}">
-        <p14:creationId xmlns:p14="http://schemas.microsoft.com/office/powerpoint/2010/main" val="1907983121"/>
+        <p14:creationId xmlns:p14="http://schemas.microsoft.com/office/powerpoint/2010/main" val="888162361"/>
       </p:ext>
     </p:extLst>
   </p:cSld>
@@ -1010,7 +601,438 @@
           <a:bodyPr/>
           <a:lstStyle/>
           <a:p>
+            <a:r>
+              <a:rPr lang="en-US" dirty="0"/>
+              <a:t>Pragmatic</a:t>
+            </a:r>
+          </a:p>
+          <a:p>
+            <a:pPr marL="171450" indent="-171450">
+              <a:buFont typeface="Arial" panose="020B0604020202020204" pitchFamily="34" charset="0"/>
+              <a:buChar char="•"/>
+            </a:pPr>
+            <a:r>
+              <a:rPr lang="en-US" dirty="0"/>
+              <a:t>Follows a development pattern that fits the identity of your system. If you system lends itself to RPC, don’t waste time trying to represent everything as entities and be perfectly RESTful.</a:t>
+            </a:r>
+          </a:p>
+          <a:p>
+            <a:pPr marL="171450" indent="-171450">
+              <a:buFont typeface="Arial" panose="020B0604020202020204" pitchFamily="34" charset="0"/>
+              <a:buChar char="•"/>
+            </a:pPr>
+            <a:r>
+              <a:rPr lang="en-US" dirty="0"/>
+              <a:t>Don’t just represent your DB through your API. Your clients pay you for your business logic, not access to your DB. Represent functionality, not just entities.</a:t>
+            </a:r>
+          </a:p>
+          <a:p>
+            <a:pPr marL="171450" indent="-171450">
+              <a:buFont typeface="Arial" panose="020B0604020202020204" pitchFamily="34" charset="0"/>
+              <a:buChar char="•"/>
+            </a:pPr>
+            <a:r>
+              <a:rPr lang="en-US" dirty="0"/>
+              <a:t>You don’t need to use OAUTH/OIDC if you use sessions everywhere else.</a:t>
+            </a:r>
+          </a:p>
+          <a:p>
+            <a:pPr marL="171450" indent="-171450">
+              <a:buFont typeface="Arial" panose="020B0604020202020204" pitchFamily="34" charset="0"/>
+              <a:buChar char="•"/>
+            </a:pPr>
+            <a:r>
+              <a:rPr lang="en-US" dirty="0"/>
+              <a:t>You don’t need to use brand new tools. Use what you’re comfortable with and what your team or organization is familiar with, unless you have a really good reason not to.</a:t>
+            </a:r>
+          </a:p>
+          <a:p>
+            <a:pPr marL="171450" indent="-171450">
+              <a:buFont typeface="Arial" panose="020B0604020202020204" pitchFamily="34" charset="0"/>
+              <a:buChar char="•"/>
+            </a:pPr>
+            <a:r>
+              <a:rPr lang="en-US" dirty="0"/>
+              <a:t>You almost certainly don’t need microservices</a:t>
+            </a:r>
+          </a:p>
+          <a:p>
+            <a:pPr marL="0" indent="0">
+              <a:buFontTx/>
+              <a:buNone/>
+            </a:pPr>
             <a:endParaRPr lang="en-US" dirty="0"/>
+          </a:p>
+          <a:p>
+            <a:pPr marL="0" indent="0">
+              <a:buFontTx/>
+              <a:buNone/>
+            </a:pPr>
+            <a:r>
+              <a:rPr lang="en-US" dirty="0"/>
+              <a:t>Consistent</a:t>
+            </a:r>
+          </a:p>
+          <a:p>
+            <a:pPr marL="171450" indent="-171450">
+              <a:buFont typeface="Arial" panose="020B0604020202020204" pitchFamily="34" charset="0"/>
+              <a:buChar char="•"/>
+            </a:pPr>
+            <a:r>
+              <a:rPr lang="en-US" dirty="0"/>
+              <a:t>Reduce the cognitive overhead of learning and consuming your API. </a:t>
+            </a:r>
+          </a:p>
+          <a:p>
+            <a:pPr marL="171450" indent="-171450">
+              <a:buFont typeface="Arial" panose="020B0604020202020204" pitchFamily="34" charset="0"/>
+              <a:buChar char="•"/>
+            </a:pPr>
+            <a:r>
+              <a:rPr lang="en-US" dirty="0"/>
+              <a:t>Uses consistent language and phrasing across the platform. Use the terms that make sense in your domain, and use them consistently across the API.</a:t>
+            </a:r>
+          </a:p>
+          <a:p>
+            <a:pPr marL="171450" indent="-171450">
+              <a:buFont typeface="Arial" panose="020B0604020202020204" pitchFamily="34" charset="0"/>
+              <a:buChar char="•"/>
+            </a:pPr>
+            <a:r>
+              <a:rPr lang="en-US" dirty="0"/>
+              <a:t>Use consistent variable names across your platform. Represent authentication information in the same way across your platform.</a:t>
+            </a:r>
+          </a:p>
+          <a:p>
+            <a:pPr marL="171450" indent="-171450">
+              <a:buFont typeface="Arial" panose="020B0604020202020204" pitchFamily="34" charset="0"/>
+              <a:buChar char="•"/>
+            </a:pPr>
+            <a:r>
+              <a:rPr lang="en-US" dirty="0"/>
+              <a:t>Form an API guidance group. Don’t cowboy things unless you have no choice</a:t>
+            </a:r>
+          </a:p>
+          <a:p>
+            <a:pPr marL="171450" indent="-171450">
+              <a:buFont typeface="Arial" panose="020B0604020202020204" pitchFamily="34" charset="0"/>
+              <a:buChar char="•"/>
+            </a:pPr>
+            <a:endParaRPr lang="en-US" dirty="0"/>
+          </a:p>
+          <a:p>
+            <a:pPr marL="0" indent="0">
+              <a:buFont typeface="Arial" panose="020B0604020202020204" pitchFamily="34" charset="0"/>
+              <a:buNone/>
+            </a:pPr>
+            <a:r>
+              <a:rPr lang="en-US" dirty="0"/>
+              <a:t>Discoverable / Documented</a:t>
+            </a:r>
+          </a:p>
+          <a:p>
+            <a:pPr marL="171450" indent="-171450">
+              <a:buFont typeface="Arial" panose="020B0604020202020204" pitchFamily="34" charset="0"/>
+              <a:buChar char="•"/>
+            </a:pPr>
+            <a:r>
+              <a:rPr lang="en-US" dirty="0"/>
+              <a:t>Internal and external</a:t>
+            </a:r>
+          </a:p>
+          <a:p>
+            <a:pPr marL="171450" indent="-171450">
+              <a:buFont typeface="Arial" panose="020B0604020202020204" pitchFamily="34" charset="0"/>
+              <a:buChar char="•"/>
+            </a:pPr>
+            <a:r>
+              <a:rPr lang="en-US" dirty="0"/>
+              <a:t>There are lots of great tools out there for exposing information about your API to the outside world. Every moment you spend on documentation will come back to help you. </a:t>
+            </a:r>
+          </a:p>
+          <a:p>
+            <a:pPr marL="171450" indent="-171450">
+              <a:buFont typeface="Arial" panose="020B0604020202020204" pitchFamily="34" charset="0"/>
+              <a:buChar char="•"/>
+            </a:pPr>
+            <a:r>
+              <a:rPr lang="en-US" dirty="0"/>
+              <a:t>APIs tend to live a long time, and you aren’t going to be able to remember why you made decisions you made.</a:t>
+            </a:r>
+          </a:p>
+          <a:p>
+            <a:pPr marL="171450" indent="-171450">
+              <a:buFont typeface="Arial" panose="020B0604020202020204" pitchFamily="34" charset="0"/>
+              <a:buChar char="•"/>
+            </a:pPr>
+            <a:r>
+              <a:rPr lang="en-US" dirty="0"/>
+              <a:t>More people read and consume your code and APIs than will ever modify them</a:t>
+            </a:r>
+          </a:p>
+          <a:p>
+            <a:pPr marL="171450" indent="-171450">
+              <a:buFont typeface="Arial" panose="020B0604020202020204" pitchFamily="34" charset="0"/>
+              <a:buChar char="•"/>
+            </a:pPr>
+            <a:r>
+              <a:rPr lang="en-US" dirty="0"/>
+              <a:t>Swagger/</a:t>
+            </a:r>
+            <a:r>
+              <a:rPr lang="en-US" dirty="0" err="1"/>
+              <a:t>OpenAPI</a:t>
+            </a:r>
+            <a:r>
+              <a:rPr lang="en-US" dirty="0"/>
+              <a:t>, GRPC, SOAP, </a:t>
+            </a:r>
+            <a:r>
+              <a:rPr lang="en-US" dirty="0" err="1"/>
+              <a:t>etc</a:t>
+            </a:r>
+            <a:r>
+              <a:rPr lang="en-US" dirty="0"/>
+              <a:t> are all valid. Yes, even SOAP.</a:t>
+            </a:r>
+          </a:p>
+          <a:p>
+            <a:pPr marL="171450" indent="-171450">
+              <a:buFont typeface="Arial" panose="020B0604020202020204" pitchFamily="34" charset="0"/>
+              <a:buChar char="•"/>
+            </a:pPr>
+            <a:r>
+              <a:rPr lang="en-US" dirty="0"/>
+              <a:t>Self documenting code is a myth.</a:t>
+            </a:r>
+          </a:p>
+          <a:p>
+            <a:pPr marL="171450" indent="-171450">
+              <a:buFont typeface="Arial" panose="020B0604020202020204" pitchFamily="34" charset="0"/>
+              <a:buChar char="•"/>
+            </a:pPr>
+            <a:endParaRPr lang="en-US" dirty="0"/>
+          </a:p>
+          <a:p>
+            <a:pPr marL="0" indent="0">
+              <a:buFont typeface="Arial" panose="020B0604020202020204" pitchFamily="34" charset="0"/>
+              <a:buNone/>
+            </a:pPr>
+            <a:r>
+              <a:rPr lang="en-US" dirty="0"/>
+              <a:t>Interactive and testable</a:t>
+            </a:r>
+          </a:p>
+          <a:p>
+            <a:pPr marL="171450" indent="-171450">
+              <a:buFont typeface="Arial" panose="020B0604020202020204" pitchFamily="34" charset="0"/>
+              <a:buChar char="•"/>
+            </a:pPr>
+            <a:r>
+              <a:rPr lang="en-US" dirty="0"/>
+              <a:t>Provide a sandbox. Don’t just provide the API, provide a low-effort way for a consumer to manage test data and consume the API without worrying about accidentally disclosing test data.</a:t>
+            </a:r>
+          </a:p>
+          <a:p>
+            <a:pPr marL="171450" indent="-171450">
+              <a:buFont typeface="Arial" panose="020B0604020202020204" pitchFamily="34" charset="0"/>
+              <a:buChar char="•"/>
+            </a:pPr>
+            <a:r>
+              <a:rPr lang="en-US" dirty="0"/>
+              <a:t>Make the sandbox interactive. Provide tooling/SDKs to go along with the API. </a:t>
+            </a:r>
+          </a:p>
+          <a:p>
+            <a:pPr marL="171450" indent="-171450">
+              <a:buFont typeface="Arial" panose="020B0604020202020204" pitchFamily="34" charset="0"/>
+              <a:buChar char="•"/>
+            </a:pPr>
+            <a:r>
+              <a:rPr lang="en-US" dirty="0"/>
+              <a:t>Have ways to simulate errors, provide immediate feedback on errors, have traffic inspection in your API</a:t>
+            </a:r>
+          </a:p>
+          <a:p>
+            <a:pPr marL="171450" indent="-171450">
+              <a:buFont typeface="Arial" panose="020B0604020202020204" pitchFamily="34" charset="0"/>
+              <a:buChar char="•"/>
+            </a:pPr>
+            <a:r>
+              <a:rPr lang="en-US" dirty="0"/>
+              <a:t>Provide a way to test at least common scenarios in your API, and make them obvious</a:t>
+            </a:r>
+          </a:p>
+          <a:p>
+            <a:pPr marL="171450" indent="-171450">
+              <a:buFont typeface="Arial" panose="020B0604020202020204" pitchFamily="34" charset="0"/>
+              <a:buChar char="•"/>
+            </a:pPr>
+            <a:r>
+              <a:rPr lang="en-US" dirty="0"/>
+              <a:t>Unit tests are great. 100% test coverage is a zero sum game.</a:t>
+            </a:r>
+          </a:p>
+          <a:p>
+            <a:pPr marL="171450" indent="-171450">
+              <a:buFont typeface="Arial" panose="020B0604020202020204" pitchFamily="34" charset="0"/>
+              <a:buChar char="•"/>
+            </a:pPr>
+            <a:endParaRPr lang="en-US" dirty="0"/>
+          </a:p>
+          <a:p>
+            <a:pPr marL="0" indent="0">
+              <a:buFont typeface="Arial" panose="020B0604020202020204" pitchFamily="34" charset="0"/>
+              <a:buNone/>
+            </a:pPr>
+            <a:r>
+              <a:rPr lang="en-US" dirty="0"/>
+              <a:t>Monitored and </a:t>
+            </a:r>
+            <a:r>
+              <a:rPr lang="en-US" dirty="0" err="1"/>
+              <a:t>debuggable</a:t>
+            </a:r>
+            <a:endParaRPr lang="en-US" dirty="0"/>
+          </a:p>
+          <a:p>
+            <a:pPr marL="171450" indent="-171450">
+              <a:buFont typeface="Arial" panose="020B0604020202020204" pitchFamily="34" charset="0"/>
+              <a:buChar char="•"/>
+            </a:pPr>
+            <a:r>
+              <a:rPr lang="en-US" dirty="0"/>
+              <a:t>You should always know about failures before your users do</a:t>
+            </a:r>
+          </a:p>
+          <a:p>
+            <a:pPr marL="171450" indent="-171450">
+              <a:buFont typeface="Arial" panose="020B0604020202020204" pitchFamily="34" charset="0"/>
+              <a:buChar char="•"/>
+            </a:pPr>
+            <a:r>
+              <a:rPr lang="en-US" dirty="0"/>
+              <a:t>Think about operations early. Build in points to track metrics, failures, runtime events.</a:t>
+            </a:r>
+          </a:p>
+          <a:p>
+            <a:pPr marL="171450" indent="-171450">
+              <a:buFont typeface="Arial" panose="020B0604020202020204" pitchFamily="34" charset="0"/>
+              <a:buChar char="•"/>
+            </a:pPr>
+            <a:r>
+              <a:rPr lang="en-US" dirty="0"/>
+              <a:t>Think about logging early. Structured logging is absolutely fantastic.</a:t>
+            </a:r>
+          </a:p>
+          <a:p>
+            <a:pPr marL="171450" indent="-171450">
+              <a:buFont typeface="Arial" panose="020B0604020202020204" pitchFamily="34" charset="0"/>
+              <a:buChar char="•"/>
+            </a:pPr>
+            <a:r>
+              <a:rPr lang="en-US" dirty="0"/>
+              <a:t>What can you log and what can’t you log? What kind of masking do you need to apply? Don’t be </a:t>
+            </a:r>
+            <a:r>
+              <a:rPr lang="en-US" dirty="0" err="1"/>
+              <a:t>facebook</a:t>
+            </a:r>
+            <a:endParaRPr lang="en-US" dirty="0"/>
+          </a:p>
+          <a:p>
+            <a:pPr marL="171450" indent="-171450">
+              <a:buFont typeface="Arial" panose="020B0604020202020204" pitchFamily="34" charset="0"/>
+              <a:buChar char="•"/>
+            </a:pPr>
+            <a:r>
+              <a:rPr lang="en-US" dirty="0"/>
+              <a:t>Choose analytics tools. If you can avoid it, don’t tie yourself directly to a certain tool, but define an application-specific abstraction and implement it for a given tool.</a:t>
+            </a:r>
+          </a:p>
+          <a:p>
+            <a:pPr marL="171450" indent="-171450">
+              <a:buFont typeface="Arial" panose="020B0604020202020204" pitchFamily="34" charset="0"/>
+              <a:buChar char="•"/>
+            </a:pPr>
+            <a:endParaRPr lang="en-US" dirty="0"/>
+          </a:p>
+          <a:p>
+            <a:pPr marL="0" indent="0">
+              <a:buFont typeface="Arial" panose="020B0604020202020204" pitchFamily="34" charset="0"/>
+              <a:buNone/>
+            </a:pPr>
+            <a:r>
+              <a:rPr lang="en-US" dirty="0"/>
+              <a:t>Deployable</a:t>
+            </a:r>
+          </a:p>
+          <a:p>
+            <a:pPr marL="171450" indent="-171450">
+              <a:buFont typeface="Arial" panose="020B0604020202020204" pitchFamily="34" charset="0"/>
+              <a:buChar char="•"/>
+            </a:pPr>
+            <a:r>
+              <a:rPr lang="en-US" dirty="0"/>
+              <a:t>To dev, testing/QA and production, builds and deployments should be as fast and one-touch as possible.</a:t>
+            </a:r>
+          </a:p>
+          <a:p>
+            <a:pPr marL="171450" indent="-171450">
+              <a:buFont typeface="Arial" panose="020B0604020202020204" pitchFamily="34" charset="0"/>
+              <a:buChar char="•"/>
+            </a:pPr>
+            <a:r>
+              <a:rPr lang="en-US" dirty="0"/>
+              <a:t>Unit/integration tests should be runnable at all stages</a:t>
+            </a:r>
+          </a:p>
+          <a:p>
+            <a:pPr marL="171450" indent="-171450">
+              <a:buFont typeface="Arial" panose="020B0604020202020204" pitchFamily="34" charset="0"/>
+              <a:buChar char="•"/>
+            </a:pPr>
+            <a:r>
+              <a:rPr lang="en-US" dirty="0"/>
+              <a:t>If it’s possible for it to “works on my machine”, you have work to do</a:t>
+            </a:r>
+          </a:p>
+          <a:p>
+            <a:pPr marL="171450" indent="-171450">
+              <a:buFont typeface="Arial" panose="020B0604020202020204" pitchFamily="34" charset="0"/>
+              <a:buChar char="•"/>
+            </a:pPr>
+            <a:endParaRPr lang="en-US" dirty="0"/>
+          </a:p>
+          <a:p>
+            <a:pPr marL="0" indent="0">
+              <a:buFont typeface="Arial" panose="020B0604020202020204" pitchFamily="34" charset="0"/>
+              <a:buNone/>
+            </a:pPr>
+            <a:r>
+              <a:rPr lang="en-US" dirty="0"/>
+              <a:t>Changeable</a:t>
+            </a:r>
+          </a:p>
+          <a:p>
+            <a:pPr marL="171450" indent="-171450">
+              <a:buFont typeface="Arial" panose="020B0604020202020204" pitchFamily="34" charset="0"/>
+              <a:buChar char="•"/>
+            </a:pPr>
+            <a:r>
+              <a:rPr lang="en-US" dirty="0"/>
+              <a:t>Bringing a new dev online should be a few-day process at most. If it takes longer than that, or you can’t fit the whole thing in one persons head, it probably isn’t factored correctly</a:t>
+            </a:r>
+          </a:p>
+          <a:p>
+            <a:pPr marL="171450" indent="-171450">
+              <a:buFont typeface="Arial" panose="020B0604020202020204" pitchFamily="34" charset="0"/>
+              <a:buChar char="•"/>
+            </a:pPr>
+            <a:r>
+              <a:rPr lang="en-US" dirty="0"/>
+              <a:t>Features should be orthogonal. You should be able to trust that if you make a change in one location, you won’t break another feature</a:t>
+            </a:r>
           </a:p>
         </p:txBody>
       </p:sp>
@@ -1040,7 +1062,175 @@
     </p:spTree>
     <p:extLst>
       <p:ext uri="{BB962C8B-B14F-4D97-AF65-F5344CB8AC3E}">
+        <p14:creationId xmlns:p14="http://schemas.microsoft.com/office/powerpoint/2010/main" val="1907983121"/>
+      </p:ext>
+    </p:extLst>
+  </p:cSld>
+  <p:clrMapOvr>
+    <a:masterClrMapping/>
+  </p:clrMapOvr>
+</p:notes>
+</file>
+
+<file path=ppt/notesSlides/notesSlide3.xml><?xml version="1.0" encoding="utf-8"?>
+<p:notes xmlns:a="http://schemas.openxmlformats.org/drawingml/2006/main" xmlns:r="http://schemas.openxmlformats.org/officeDocument/2006/relationships" xmlns:p="http://schemas.openxmlformats.org/presentationml/2006/main">
+  <p:cSld>
+    <p:spTree>
+      <p:nvGrpSpPr>
+        <p:cNvPr id="1" name=""/>
+        <p:cNvGrpSpPr/>
+        <p:nvPr/>
+      </p:nvGrpSpPr>
+      <p:grpSpPr>
+        <a:xfrm>
+          <a:off x="0" y="0"/>
+          <a:ext cx="0" cy="0"/>
+          <a:chOff x="0" y="0"/>
+          <a:chExt cx="0" cy="0"/>
+        </a:xfrm>
+      </p:grpSpPr>
+      <p:sp>
+        <p:nvSpPr>
+          <p:cNvPr id="2" name="Slide Image Placeholder 1"/>
+          <p:cNvSpPr>
+            <a:spLocks noGrp="1" noRot="1" noChangeAspect="1"/>
+          </p:cNvSpPr>
+          <p:nvPr>
+            <p:ph type="sldImg"/>
+          </p:nvPr>
+        </p:nvSpPr>
+        <p:spPr/>
+      </p:sp>
+      <p:sp>
+        <p:nvSpPr>
+          <p:cNvPr id="3" name="Notes Placeholder 2"/>
+          <p:cNvSpPr>
+            <a:spLocks noGrp="1"/>
+          </p:cNvSpPr>
+          <p:nvPr>
+            <p:ph type="body" idx="1"/>
+          </p:nvPr>
+        </p:nvSpPr>
+        <p:spPr/>
+        <p:txBody>
+          <a:bodyPr/>
+          <a:lstStyle/>
+          <a:p>
+            <a:endParaRPr lang="en-US" dirty="0"/>
+          </a:p>
+        </p:txBody>
+      </p:sp>
+      <p:sp>
+        <p:nvSpPr>
+          <p:cNvPr id="4" name="Slide Number Placeholder 3"/>
+          <p:cNvSpPr>
+            <a:spLocks noGrp="1"/>
+          </p:cNvSpPr>
+          <p:nvPr>
+            <p:ph type="sldNum" sz="quarter" idx="5"/>
+          </p:nvPr>
+        </p:nvSpPr>
+        <p:spPr/>
+        <p:txBody>
+          <a:bodyPr/>
+          <a:lstStyle/>
+          <a:p>
+            <a:fld id="{14F76762-4E4C-4BAC-B1C4-75C6B3E0A9B1}" type="slidenum">
+              <a:rPr lang="en-US" smtClean="0"/>
+              <a:t>5</a:t>
+            </a:fld>
+            <a:endParaRPr lang="en-US"/>
+          </a:p>
+        </p:txBody>
+      </p:sp>
+    </p:spTree>
+    <p:extLst>
+      <p:ext uri="{BB962C8B-B14F-4D97-AF65-F5344CB8AC3E}">
         <p14:creationId xmlns:p14="http://schemas.microsoft.com/office/powerpoint/2010/main" val="2905508102"/>
+      </p:ext>
+    </p:extLst>
+  </p:cSld>
+  <p:clrMapOvr>
+    <a:masterClrMapping/>
+  </p:clrMapOvr>
+</p:notes>
+</file>
+
+<file path=ppt/notesSlides/notesSlide4.xml><?xml version="1.0" encoding="utf-8"?>
+<p:notes xmlns:a="http://schemas.openxmlformats.org/drawingml/2006/main" xmlns:r="http://schemas.openxmlformats.org/officeDocument/2006/relationships" xmlns:p="http://schemas.openxmlformats.org/presentationml/2006/main">
+  <p:cSld>
+    <p:spTree>
+      <p:nvGrpSpPr>
+        <p:cNvPr id="1" name=""/>
+        <p:cNvGrpSpPr/>
+        <p:nvPr/>
+      </p:nvGrpSpPr>
+      <p:grpSpPr>
+        <a:xfrm>
+          <a:off x="0" y="0"/>
+          <a:ext cx="0" cy="0"/>
+          <a:chOff x="0" y="0"/>
+          <a:chExt cx="0" cy="0"/>
+        </a:xfrm>
+      </p:grpSpPr>
+      <p:sp>
+        <p:nvSpPr>
+          <p:cNvPr id="2" name="Slide Image Placeholder 1"/>
+          <p:cNvSpPr>
+            <a:spLocks noGrp="1" noRot="1" noChangeAspect="1"/>
+          </p:cNvSpPr>
+          <p:nvPr>
+            <p:ph type="sldImg"/>
+          </p:nvPr>
+        </p:nvSpPr>
+        <p:spPr/>
+      </p:sp>
+      <p:sp>
+        <p:nvSpPr>
+          <p:cNvPr id="3" name="Notes Placeholder 2"/>
+          <p:cNvSpPr>
+            <a:spLocks noGrp="1"/>
+          </p:cNvSpPr>
+          <p:nvPr>
+            <p:ph type="body" idx="1"/>
+          </p:nvPr>
+        </p:nvSpPr>
+        <p:spPr/>
+        <p:txBody>
+          <a:bodyPr/>
+          <a:lstStyle/>
+          <a:p>
+            <a:endParaRPr lang="en-US" dirty="0"/>
+          </a:p>
+        </p:txBody>
+      </p:sp>
+      <p:sp>
+        <p:nvSpPr>
+          <p:cNvPr id="4" name="Slide Number Placeholder 3"/>
+          <p:cNvSpPr>
+            <a:spLocks noGrp="1"/>
+          </p:cNvSpPr>
+          <p:nvPr>
+            <p:ph type="sldNum" sz="quarter" idx="5"/>
+          </p:nvPr>
+        </p:nvSpPr>
+        <p:spPr/>
+        <p:txBody>
+          <a:bodyPr/>
+          <a:lstStyle/>
+          <a:p>
+            <a:fld id="{14F76762-4E4C-4BAC-B1C4-75C6B3E0A9B1}" type="slidenum">
+              <a:rPr lang="en-US" smtClean="0"/>
+              <a:t>10</a:t>
+            </a:fld>
+            <a:endParaRPr lang="en-US"/>
+          </a:p>
+        </p:txBody>
+      </p:sp>
+    </p:spTree>
+    <p:extLst>
+      <p:ext uri="{BB962C8B-B14F-4D97-AF65-F5344CB8AC3E}">
+        <p14:creationId xmlns:p14="http://schemas.microsoft.com/office/powerpoint/2010/main" val="3503300221"/>
       </p:ext>
     </p:extLst>
   </p:cSld>
@@ -4653,10 +4843,129 @@
           </a:p>
         </p:txBody>
       </p:sp>
+      <p:pic>
+        <p:nvPicPr>
+          <p:cNvPr id="5" name="Picture 4" descr="Affinity_WhiteLogo.png">
+            <a:extLst>
+              <a:ext uri="{FF2B5EF4-FFF2-40B4-BE49-F238E27FC236}">
+                <a16:creationId xmlns:a16="http://schemas.microsoft.com/office/drawing/2014/main" id="{F7079882-7CFD-4DC1-A00A-E34469F3EC7A}"/>
+              </a:ext>
+            </a:extLst>
+          </p:cNvPr>
+          <p:cNvPicPr>
+            <a:picLocks noChangeAspect="1"/>
+          </p:cNvPicPr>
+          <p:nvPr/>
+        </p:nvPicPr>
+        <p:blipFill>
+          <a:blip r:embed="rId3">
+            <a:extLst>
+              <a:ext uri="{28A0092B-C50C-407E-A947-70E740481C1C}">
+                <a14:useLocalDpi xmlns:a14="http://schemas.microsoft.com/office/drawing/2010/main" val="0"/>
+              </a:ext>
+            </a:extLst>
+          </a:blip>
+          <a:stretch>
+            <a:fillRect/>
+          </a:stretch>
+        </p:blipFill>
+        <p:spPr>
+          <a:xfrm>
+            <a:off x="9677191" y="5968226"/>
+            <a:ext cx="1309245" cy="591391"/>
+          </a:xfrm>
+          <a:prstGeom prst="rect">
+            <a:avLst/>
+          </a:prstGeom>
+        </p:spPr>
+      </p:pic>
     </p:spTree>
     <p:extLst>
       <p:ext uri="{BB962C8B-B14F-4D97-AF65-F5344CB8AC3E}">
         <p14:creationId xmlns:p14="http://schemas.microsoft.com/office/powerpoint/2010/main" val="2448095567"/>
+      </p:ext>
+    </p:extLst>
+  </p:cSld>
+  <p:clrMapOvr>
+    <a:masterClrMapping/>
+  </p:clrMapOvr>
+</p:sld>
+</file>
+
+<file path=ppt/slides/slide10.xml><?xml version="1.0" encoding="utf-8"?>
+<p:sld xmlns:a="http://schemas.openxmlformats.org/drawingml/2006/main" xmlns:r="http://schemas.openxmlformats.org/officeDocument/2006/relationships" xmlns:p="http://schemas.openxmlformats.org/presentationml/2006/main">
+  <p:cSld>
+    <p:spTree>
+      <p:nvGrpSpPr>
+        <p:cNvPr id="1" name=""/>
+        <p:cNvGrpSpPr/>
+        <p:nvPr/>
+      </p:nvGrpSpPr>
+      <p:grpSpPr>
+        <a:xfrm>
+          <a:off x="0" y="0"/>
+          <a:ext cx="0" cy="0"/>
+          <a:chOff x="0" y="0"/>
+          <a:chExt cx="0" cy="0"/>
+        </a:xfrm>
+      </p:grpSpPr>
+      <p:sp>
+        <p:nvSpPr>
+          <p:cNvPr id="2" name="Title 1">
+            <a:extLst>
+              <a:ext uri="{FF2B5EF4-FFF2-40B4-BE49-F238E27FC236}">
+                <a16:creationId xmlns:a16="http://schemas.microsoft.com/office/drawing/2014/main" id="{0BBD5997-C31F-47EE-BF6B-2123E460D13B}"/>
+              </a:ext>
+            </a:extLst>
+          </p:cNvPr>
+          <p:cNvSpPr>
+            <a:spLocks noGrp="1"/>
+          </p:cNvSpPr>
+          <p:nvPr>
+            <p:ph type="title"/>
+          </p:nvPr>
+        </p:nvSpPr>
+        <p:spPr/>
+        <p:txBody>
+          <a:bodyPr/>
+          <a:lstStyle/>
+          <a:p>
+            <a:r>
+              <a:rPr lang="en-US" dirty="0"/>
+              <a:t>Let’s build an API</a:t>
+            </a:r>
+          </a:p>
+        </p:txBody>
+      </p:sp>
+      <p:sp>
+        <p:nvSpPr>
+          <p:cNvPr id="3" name="Content Placeholder 2">
+            <a:extLst>
+              <a:ext uri="{FF2B5EF4-FFF2-40B4-BE49-F238E27FC236}">
+                <a16:creationId xmlns:a16="http://schemas.microsoft.com/office/drawing/2014/main" id="{195164A0-F9E2-4976-BCED-72A493B1C7D7}"/>
+              </a:ext>
+            </a:extLst>
+          </p:cNvPr>
+          <p:cNvSpPr>
+            <a:spLocks noGrp="1"/>
+          </p:cNvSpPr>
+          <p:nvPr>
+            <p:ph idx="1"/>
+          </p:nvPr>
+        </p:nvSpPr>
+        <p:spPr/>
+        <p:txBody>
+          <a:bodyPr/>
+          <a:lstStyle/>
+          <a:p>
+            <a:endParaRPr lang="en-US"/>
+          </a:p>
+        </p:txBody>
+      </p:sp>
+    </p:spTree>
+    <p:extLst>
+      <p:ext uri="{BB962C8B-B14F-4D97-AF65-F5344CB8AC3E}">
+        <p14:creationId xmlns:p14="http://schemas.microsoft.com/office/powerpoint/2010/main" val="3000428590"/>
       </p:ext>
     </p:extLst>
   </p:cSld>
@@ -4773,53 +5082,6 @@
               <a:rPr lang="en-US" dirty="0"/>
               <a:t>Currently of Affinity Credit Union</a:t>
             </a:r>
-          </a:p>
-          <a:p>
-            <a:pPr marL="285750" indent="-285750">
-              <a:buFont typeface="Arial" panose="020B0604020202020204" pitchFamily="34" charset="0"/>
-              <a:buChar char="•"/>
-            </a:pPr>
-            <a:r>
-              <a:rPr lang="en-US" dirty="0"/>
-              <a:t>Daily drivers</a:t>
-            </a:r>
-          </a:p>
-          <a:p>
-            <a:pPr marL="742950" lvl="1" indent="-285750">
-              <a:buFont typeface="Arial" panose="020B0604020202020204" pitchFamily="34" charset="0"/>
-              <a:buChar char="•"/>
-            </a:pPr>
-            <a:r>
-              <a:rPr lang="en-US" dirty="0"/>
-              <a:t> asp.net, asp.net core using C#</a:t>
-            </a:r>
-          </a:p>
-          <a:p>
-            <a:pPr marL="742950" lvl="1" indent="-285750">
-              <a:buFont typeface="Arial" panose="020B0604020202020204" pitchFamily="34" charset="0"/>
-              <a:buChar char="•"/>
-            </a:pPr>
-            <a:r>
-              <a:rPr lang="en-US" dirty="0"/>
-              <a:t>visual studio 2017</a:t>
-            </a:r>
-          </a:p>
-          <a:p>
-            <a:pPr marL="742950" lvl="1" indent="-285750">
-              <a:buFont typeface="Arial" panose="020B0604020202020204" pitchFamily="34" charset="0"/>
-              <a:buChar char="•"/>
-            </a:pPr>
-            <a:r>
-              <a:rPr lang="en-US" dirty="0"/>
-              <a:t>git cli (bash)</a:t>
-            </a:r>
-          </a:p>
-          <a:p>
-            <a:pPr marL="742950" lvl="1" indent="-285750">
-              <a:buFont typeface="Arial" panose="020B0604020202020204" pitchFamily="34" charset="0"/>
-              <a:buChar char="•"/>
-            </a:pPr>
-            <a:endParaRPr lang="en-US" dirty="0"/>
           </a:p>
           <a:p>
             <a:pPr marL="742950" lvl="1" indent="-285750">
@@ -4872,7 +5134,7 @@
           <p:cNvPr id="2" name="Title 1">
             <a:extLst>
               <a:ext uri="{FF2B5EF4-FFF2-40B4-BE49-F238E27FC236}">
-                <a16:creationId xmlns:a16="http://schemas.microsoft.com/office/drawing/2014/main" id="{E9612655-DF21-4C22-BF8C-3D7B115123B3}"/>
+                <a16:creationId xmlns:a16="http://schemas.microsoft.com/office/drawing/2014/main" id="{2C98A946-0DC0-4873-9FE2-079FECADC78F}"/>
               </a:ext>
             </a:extLst>
           </p:cNvPr>
@@ -4890,7 +5152,7 @@
           <a:p>
             <a:r>
               <a:rPr lang="en-US" dirty="0"/>
-              <a:t>What makes a good API?</a:t>
+              <a:t>Opinions ahead</a:t>
             </a:r>
           </a:p>
         </p:txBody>
@@ -4900,7 +5162,7 @@
           <p:cNvPr id="3" name="Content Placeholder 2">
             <a:extLst>
               <a:ext uri="{FF2B5EF4-FFF2-40B4-BE49-F238E27FC236}">
-                <a16:creationId xmlns:a16="http://schemas.microsoft.com/office/drawing/2014/main" id="{57C3793E-9A80-4BD0-A166-0A3F671DFDE6}"/>
+                <a16:creationId xmlns:a16="http://schemas.microsoft.com/office/drawing/2014/main" id="{5700A732-0C8A-465F-8982-D231A07D79EE}"/>
               </a:ext>
             </a:extLst>
           </p:cNvPr>
@@ -4922,8 +5184,21 @@
             </a:pPr>
             <a:r>
               <a:rPr lang="en-US" dirty="0"/>
-              <a:t>Pragmatic</a:t>
-            </a:r>
+              <a:t>A (very) opinionated approach to asp.net core</a:t>
+            </a:r>
+          </a:p>
+          <a:p>
+            <a:pPr marL="742950" lvl="1" indent="-285750">
+              <a:buFont typeface="Arial" panose="020B0604020202020204" pitchFamily="34" charset="0"/>
+              <a:buChar char="•"/>
+            </a:pPr>
+            <a:r>
+              <a:rPr lang="en-US" dirty="0">
+                <a:hlinkClick r:id="rId2"/>
+              </a:rPr>
+              <a:t>https://www.youtube.com/watch?v=6Fi5dRVxOvc</a:t>
+            </a:r>
+            <a:endParaRPr lang="en-US" dirty="0"/>
           </a:p>
           <a:p>
             <a:pPr marL="285750" indent="-285750">
@@ -4932,86 +5207,95 @@
             </a:pPr>
             <a:r>
               <a:rPr lang="en-US" dirty="0"/>
-              <a:t>Consistent</a:t>
-            </a:r>
+              <a:t>Vertical slice architecture</a:t>
+            </a:r>
+          </a:p>
+          <a:p>
+            <a:pPr marL="742950" lvl="1" indent="-285750">
+              <a:buFont typeface="Arial" panose="020B0604020202020204" pitchFamily="34" charset="0"/>
+              <a:buChar char="•"/>
+            </a:pPr>
+            <a:r>
+              <a:rPr lang="en-US" dirty="0">
+                <a:hlinkClick r:id="rId3"/>
+              </a:rPr>
+              <a:t>https://www.youtube.com/watch?v=SUiWfhAhgQw</a:t>
+            </a:r>
+            <a:endParaRPr lang="en-US" dirty="0"/>
+          </a:p>
+          <a:p>
+            <a:pPr marL="742950" lvl="1" indent="-285750">
+              <a:buFont typeface="Arial" panose="020B0604020202020204" pitchFamily="34" charset="0"/>
+              <a:buChar char="•"/>
+            </a:pPr>
+            <a:r>
+              <a:rPr lang="en-US" dirty="0">
+                <a:hlinkClick r:id="rId4"/>
+              </a:rPr>
+              <a:t>https://www.youtube.com/watch?v=AUrKofVRHV4</a:t>
+            </a:r>
+            <a:endParaRPr lang="en-US" dirty="0"/>
           </a:p>
           <a:p>
             <a:pPr marL="285750" indent="-285750">
               <a:buFont typeface="Arial" panose="020B0604020202020204" pitchFamily="34" charset="0"/>
               <a:buChar char="•"/>
             </a:pPr>
-            <a:r>
-              <a:rPr lang="en-US" dirty="0"/>
-              <a:t>Discoverable</a:t>
-            </a:r>
-          </a:p>
-          <a:p>
-            <a:pPr marL="285750" indent="-285750">
-              <a:buFont typeface="Arial" panose="020B0604020202020204" pitchFamily="34" charset="0"/>
-              <a:buChar char="•"/>
-            </a:pPr>
-            <a:r>
-              <a:rPr lang="en-US" dirty="0"/>
-              <a:t>Interactive</a:t>
-            </a:r>
-          </a:p>
-          <a:p>
-            <a:pPr marL="285750" indent="-285750">
-              <a:buFont typeface="Arial" panose="020B0604020202020204" pitchFamily="34" charset="0"/>
-              <a:buChar char="•"/>
-            </a:pPr>
-            <a:r>
-              <a:rPr lang="en-US" dirty="0"/>
-              <a:t>Testable</a:t>
-            </a:r>
-          </a:p>
-          <a:p>
-            <a:pPr marL="285750" indent="-285750">
-              <a:buFont typeface="Arial" panose="020B0604020202020204" pitchFamily="34" charset="0"/>
-              <a:buChar char="•"/>
-            </a:pPr>
-            <a:r>
-              <a:rPr lang="en-US" dirty="0"/>
-              <a:t>Monitored</a:t>
-            </a:r>
-          </a:p>
-          <a:p>
-            <a:pPr marL="285750" indent="-285750">
-              <a:buFont typeface="Arial" panose="020B0604020202020204" pitchFamily="34" charset="0"/>
-              <a:buChar char="•"/>
-            </a:pPr>
-            <a:r>
-              <a:rPr lang="en-US" dirty="0" err="1"/>
-              <a:t>Debuggable</a:t>
-            </a:r>
             <a:endParaRPr lang="en-US" dirty="0"/>
           </a:p>
-          <a:p>
-            <a:pPr marL="285750" indent="-285750">
-              <a:buFont typeface="Arial" panose="020B0604020202020204" pitchFamily="34" charset="0"/>
-              <a:buChar char="•"/>
-            </a:pPr>
-            <a:r>
-              <a:rPr lang="en-US" dirty="0"/>
-              <a:t>Deployable</a:t>
-            </a:r>
-          </a:p>
-          <a:p>
-            <a:pPr marL="285750" indent="-285750">
-              <a:buFont typeface="Arial" panose="020B0604020202020204" pitchFamily="34" charset="0"/>
-              <a:buChar char="•"/>
-            </a:pPr>
-            <a:r>
-              <a:rPr lang="en-US" dirty="0"/>
-              <a:t>Changeable</a:t>
-            </a:r>
-          </a:p>
-        </p:txBody>
-      </p:sp>
+        </p:txBody>
+      </p:sp>
+      <p:pic>
+        <p:nvPicPr>
+          <p:cNvPr id="1026" name="Picture 2" descr="Image result for that's just like your opinion man">
+            <a:extLst>
+              <a:ext uri="{FF2B5EF4-FFF2-40B4-BE49-F238E27FC236}">
+                <a16:creationId xmlns:a16="http://schemas.microsoft.com/office/drawing/2014/main" id="{2089C431-E637-44D0-94D5-3D8384E4DD87}"/>
+              </a:ext>
+            </a:extLst>
+          </p:cNvPr>
+          <p:cNvPicPr>
+            <a:picLocks noChangeAspect="1" noChangeArrowheads="1"/>
+          </p:cNvPicPr>
+          <p:nvPr/>
+        </p:nvPicPr>
+        <p:blipFill>
+          <a:blip r:embed="rId5">
+            <a:extLst>
+              <a:ext uri="{28A0092B-C50C-407E-A947-70E740481C1C}">
+                <a14:useLocalDpi xmlns:a14="http://schemas.microsoft.com/office/drawing/2010/main" val="0"/>
+              </a:ext>
+            </a:extLst>
+          </a:blip>
+          <a:srcRect/>
+          <a:stretch>
+            <a:fillRect/>
+          </a:stretch>
+        </p:blipFill>
+        <p:spPr bwMode="auto">
+          <a:xfrm>
+            <a:off x="8582527" y="4836695"/>
+            <a:ext cx="3609473" cy="2021305"/>
+          </a:xfrm>
+          <a:prstGeom prst="rect">
+            <a:avLst/>
+          </a:prstGeom>
+          <a:noFill/>
+          <a:extLst>
+            <a:ext uri="{909E8E84-426E-40DD-AFC4-6F175D3DCCD1}">
+              <a14:hiddenFill xmlns:a14="http://schemas.microsoft.com/office/drawing/2010/main">
+                <a:solidFill>
+                  <a:srgbClr val="FFFFFF"/>
+                </a:solidFill>
+              </a14:hiddenFill>
+            </a:ext>
+          </a:extLst>
+        </p:spPr>
+      </p:pic>
     </p:spTree>
     <p:extLst>
       <p:ext uri="{BB962C8B-B14F-4D97-AF65-F5344CB8AC3E}">
-        <p14:creationId xmlns:p14="http://schemas.microsoft.com/office/powerpoint/2010/main" val="3118573815"/>
+        <p14:creationId xmlns:p14="http://schemas.microsoft.com/office/powerpoint/2010/main" val="575422800"/>
       </p:ext>
     </p:extLst>
   </p:cSld>
@@ -5043,7 +5327,7 @@
           <p:cNvPr id="2" name="Title 1">
             <a:extLst>
               <a:ext uri="{FF2B5EF4-FFF2-40B4-BE49-F238E27FC236}">
-                <a16:creationId xmlns:a16="http://schemas.microsoft.com/office/drawing/2014/main" id="{2E14DAB8-E98F-431D-A10B-CEF1578262B5}"/>
+                <a16:creationId xmlns:a16="http://schemas.microsoft.com/office/drawing/2014/main" id="{E9612655-DF21-4C22-BF8C-3D7B115123B3}"/>
               </a:ext>
             </a:extLst>
           </p:cNvPr>
@@ -5061,15 +5345,7 @@
           <a:p>
             <a:r>
               <a:rPr lang="en-US" dirty="0"/>
-              <a:t>My current </a:t>
-            </a:r>
-            <a:r>
-              <a:rPr lang="en-US" dirty="0" err="1"/>
-              <a:t>favourite</a:t>
-            </a:r>
-            <a:r>
-              <a:rPr lang="en-US" dirty="0"/>
-              <a:t> architecture</a:t>
+              <a:t>What makes a good API?</a:t>
             </a:r>
           </a:p>
         </p:txBody>
@@ -5079,7 +5355,7 @@
           <p:cNvPr id="3" name="Content Placeholder 2">
             <a:extLst>
               <a:ext uri="{FF2B5EF4-FFF2-40B4-BE49-F238E27FC236}">
-                <a16:creationId xmlns:a16="http://schemas.microsoft.com/office/drawing/2014/main" id="{9E449FEB-B415-4475-BC7C-118FD2AF8F11}"/>
+                <a16:creationId xmlns:a16="http://schemas.microsoft.com/office/drawing/2014/main" id="{57C3793E-9A80-4BD0-A166-0A3F671DFDE6}"/>
               </a:ext>
             </a:extLst>
           </p:cNvPr>
@@ -5092,7 +5368,7 @@
         </p:nvSpPr>
         <p:spPr/>
         <p:txBody>
-          <a:bodyPr/>
+          <a:bodyPr numCol="2"/>
           <a:lstStyle/>
           <a:p>
             <a:pPr marL="285750" indent="-285750">
@@ -5101,16 +5377,97 @@
             </a:pPr>
             <a:r>
               <a:rPr lang="en-US" dirty="0"/>
-              <a:t>Define message input/output contracts (</a:t>
-            </a:r>
+              <a:t>Pragmatic</a:t>
+            </a:r>
+          </a:p>
+          <a:p>
+            <a:pPr marL="285750" indent="-285750">
+              <a:buFont typeface="Arial" panose="020B0604020202020204" pitchFamily="34" charset="0"/>
+              <a:buChar char="•"/>
+            </a:pPr>
+            <a:r>
+              <a:rPr lang="en-US" dirty="0"/>
+              <a:t>Consistent</a:t>
+            </a:r>
+          </a:p>
+          <a:p>
+            <a:pPr marL="285750" indent="-285750">
+              <a:buFont typeface="Arial" panose="020B0604020202020204" pitchFamily="34" charset="0"/>
+              <a:buChar char="•"/>
+            </a:pPr>
+            <a:r>
+              <a:rPr lang="en-US" dirty="0"/>
+              <a:t>Discoverable</a:t>
+            </a:r>
+          </a:p>
+          <a:p>
+            <a:pPr marL="285750" indent="-285750">
+              <a:buFont typeface="Arial" panose="020B0604020202020204" pitchFamily="34" charset="0"/>
+              <a:buChar char="•"/>
+            </a:pPr>
+            <a:r>
+              <a:rPr lang="en-US" dirty="0"/>
+              <a:t>Interactive</a:t>
+            </a:r>
+          </a:p>
+          <a:p>
+            <a:pPr marL="285750" indent="-285750">
+              <a:buFont typeface="Arial" panose="020B0604020202020204" pitchFamily="34" charset="0"/>
+              <a:buChar char="•"/>
+            </a:pPr>
+            <a:r>
+              <a:rPr lang="en-US" dirty="0"/>
+              <a:t>Testable</a:t>
+            </a:r>
+          </a:p>
+          <a:p>
+            <a:pPr marL="285750" indent="-285750">
+              <a:buFont typeface="Arial" panose="020B0604020202020204" pitchFamily="34" charset="0"/>
+              <a:buChar char="•"/>
+            </a:pPr>
+            <a:endParaRPr lang="en-US" dirty="0"/>
+          </a:p>
+          <a:p>
+            <a:pPr marL="285750" indent="-285750">
+              <a:buFont typeface="Arial" panose="020B0604020202020204" pitchFamily="34" charset="0"/>
+              <a:buChar char="•"/>
+            </a:pPr>
+            <a:endParaRPr lang="en-US" dirty="0"/>
+          </a:p>
+          <a:p>
+            <a:pPr marL="285750" indent="-285750">
+              <a:buFont typeface="Arial" panose="020B0604020202020204" pitchFamily="34" charset="0"/>
+              <a:buChar char="•"/>
+            </a:pPr>
+            <a:endParaRPr lang="en-US" dirty="0"/>
+          </a:p>
+          <a:p>
+            <a:pPr marL="285750" indent="-285750">
+              <a:buFont typeface="Arial" panose="020B0604020202020204" pitchFamily="34" charset="0"/>
+              <a:buChar char="•"/>
+            </a:pPr>
+            <a:endParaRPr lang="en-US" dirty="0"/>
+          </a:p>
+          <a:p>
+            <a:pPr marL="285750" indent="-285750">
+              <a:buFont typeface="Arial" panose="020B0604020202020204" pitchFamily="34" charset="0"/>
+              <a:buChar char="•"/>
+            </a:pPr>
+            <a:r>
+              <a:rPr lang="en-US" dirty="0"/>
+              <a:t>Monitored</a:t>
+            </a:r>
+          </a:p>
+          <a:p>
+            <a:pPr marL="285750" indent="-285750">
+              <a:buFont typeface="Arial" panose="020B0604020202020204" pitchFamily="34" charset="0"/>
+              <a:buChar char="•"/>
+            </a:pPr>
             <a:r>
               <a:rPr lang="en-US" dirty="0" err="1"/>
-              <a:t>viewmodels</a:t>
-            </a:r>
-            <a:r>
-              <a:rPr lang="en-US" dirty="0"/>
-              <a:t>)</a:t>
-            </a:r>
+              <a:t>Debuggable</a:t>
+            </a:r>
+            <a:endParaRPr lang="en-US" dirty="0"/>
           </a:p>
           <a:p>
             <a:pPr marL="285750" indent="-285750">
@@ -5119,15 +5476,7 @@
             </a:pPr>
             <a:r>
               <a:rPr lang="en-US" dirty="0"/>
-              <a:t>Wrap input/output </a:t>
-            </a:r>
-            <a:r>
-              <a:rPr lang="en-US" dirty="0" err="1"/>
-              <a:t>viewmodels</a:t>
-            </a:r>
-            <a:r>
-              <a:rPr lang="en-US" dirty="0"/>
-              <a:t> with metadata</a:t>
+              <a:t>Deployable</a:t>
             </a:r>
           </a:p>
           <a:p>
@@ -5137,134 +5486,15 @@
             </a:pPr>
             <a:r>
               <a:rPr lang="en-US" dirty="0"/>
-              <a:t>Build a message handling pipeline</a:t>
-            </a:r>
-          </a:p>
-          <a:p>
-            <a:pPr marL="742950" lvl="1" indent="-285750">
-              <a:buFont typeface="Arial" panose="020B0604020202020204" pitchFamily="34" charset="0"/>
-              <a:buChar char="•"/>
-            </a:pPr>
-            <a:r>
-              <a:rPr lang="en-US" dirty="0"/>
-              <a:t>Cross-cutting concerns as pipeline stages / behaviors</a:t>
-            </a:r>
-          </a:p>
-          <a:p>
-            <a:pPr marL="742950" lvl="1" indent="-285750">
-              <a:buFont typeface="Arial" panose="020B0604020202020204" pitchFamily="34" charset="0"/>
-              <a:buChar char="•"/>
-            </a:pPr>
-            <a:r>
-              <a:rPr lang="en-US" dirty="0"/>
-              <a:t>Terminal pipeline handlers</a:t>
-            </a:r>
-          </a:p>
-          <a:p>
-            <a:pPr marL="285750" indent="-285750">
-              <a:buFont typeface="Arial" panose="020B0604020202020204" pitchFamily="34" charset="0"/>
-              <a:buChar char="•"/>
-            </a:pPr>
-            <a:r>
-              <a:rPr lang="en-US" dirty="0"/>
-              <a:t>Decouple request parsing and response formatting from handling</a:t>
-            </a:r>
-          </a:p>
-          <a:p>
-            <a:pPr marL="742950" lvl="1" indent="-285750">
-              <a:buFont typeface="Arial" panose="020B0604020202020204" pitchFamily="34" charset="0"/>
-              <a:buChar char="•"/>
-            </a:pPr>
-            <a:r>
-              <a:rPr lang="en-US" dirty="0"/>
-              <a:t>Reduce/eliminate handler’s dependency on any framework</a:t>
-            </a:r>
-          </a:p>
-          <a:p>
-            <a:pPr marL="285750" indent="-285750">
-              <a:buFont typeface="Arial" panose="020B0604020202020204" pitchFamily="34" charset="0"/>
-              <a:buChar char="•"/>
-            </a:pPr>
-            <a:r>
-              <a:rPr lang="en-US" dirty="0"/>
-              <a:t>Use </a:t>
-            </a:r>
-            <a:r>
-              <a:rPr lang="en-US" dirty="0" err="1"/>
-              <a:t>swashbuckle</a:t>
-            </a:r>
-            <a:r>
-              <a:rPr lang="en-US" dirty="0"/>
-              <a:t> to generate swagger doc/UI from </a:t>
-            </a:r>
-            <a:r>
-              <a:rPr lang="en-US" dirty="0" err="1"/>
-              <a:t>APIExplorer</a:t>
-            </a:r>
-            <a:endParaRPr lang="en-US" dirty="0"/>
-          </a:p>
-          <a:p>
-            <a:pPr marL="285750" indent="-285750">
-              <a:buFont typeface="Arial" panose="020B0604020202020204" pitchFamily="34" charset="0"/>
-              <a:buChar char="•"/>
-            </a:pPr>
-            <a:r>
-              <a:rPr lang="en-US" dirty="0"/>
-              <a:t>Build multiple sets of handlers</a:t>
-            </a:r>
-          </a:p>
-          <a:p>
-            <a:pPr marL="742950" lvl="1" indent="-285750">
-              <a:buFont typeface="Arial" panose="020B0604020202020204" pitchFamily="34" charset="0"/>
-              <a:buChar char="•"/>
-            </a:pPr>
-            <a:r>
-              <a:rPr lang="en-US" dirty="0"/>
-              <a:t>Playground/Mock/Test/Prod</a:t>
-            </a:r>
-          </a:p>
-          <a:p>
-            <a:pPr marL="285750" indent="-285750">
-              <a:buFont typeface="Arial" panose="020B0604020202020204" pitchFamily="34" charset="0"/>
-              <a:buChar char="•"/>
-            </a:pPr>
-            <a:r>
-              <a:rPr lang="en-US" dirty="0"/>
-              <a:t>Use DI framework to </a:t>
-            </a:r>
-            <a:r>
-              <a:rPr lang="en-US"/>
-              <a:t>swap handlers based on config</a:t>
-            </a:r>
-            <a:endParaRPr lang="en-US" dirty="0"/>
-          </a:p>
-          <a:p>
-            <a:pPr marL="285750" indent="-285750">
-              <a:buFont typeface="Arial" panose="020B0604020202020204" pitchFamily="34" charset="0"/>
-              <a:buChar char="•"/>
-            </a:pPr>
-            <a:endParaRPr lang="en-US" dirty="0"/>
-          </a:p>
-          <a:p>
-            <a:pPr marL="285750" indent="-285750">
-              <a:buFont typeface="Arial" panose="020B0604020202020204" pitchFamily="34" charset="0"/>
-              <a:buChar char="•"/>
-            </a:pPr>
-            <a:endParaRPr lang="en-US" dirty="0"/>
-          </a:p>
-          <a:p>
-            <a:pPr marL="285750" indent="-285750">
-              <a:buFont typeface="Arial" panose="020B0604020202020204" pitchFamily="34" charset="0"/>
-              <a:buChar char="•"/>
-            </a:pPr>
-            <a:endParaRPr lang="en-US" dirty="0"/>
+              <a:t>Changeable</a:t>
+            </a:r>
           </a:p>
         </p:txBody>
       </p:sp>
     </p:spTree>
     <p:extLst>
       <p:ext uri="{BB962C8B-B14F-4D97-AF65-F5344CB8AC3E}">
-        <p14:creationId xmlns:p14="http://schemas.microsoft.com/office/powerpoint/2010/main" val="2769956169"/>
+        <p14:creationId xmlns:p14="http://schemas.microsoft.com/office/powerpoint/2010/main" val="3118573815"/>
       </p:ext>
     </p:extLst>
   </p:cSld>
@@ -5296,7 +5526,7 @@
           <p:cNvPr id="2" name="Title 1">
             <a:extLst>
               <a:ext uri="{FF2B5EF4-FFF2-40B4-BE49-F238E27FC236}">
-                <a16:creationId xmlns:a16="http://schemas.microsoft.com/office/drawing/2014/main" id="{8CD50955-7322-4A61-9F8E-52926EF73761}"/>
+                <a16:creationId xmlns:a16="http://schemas.microsoft.com/office/drawing/2014/main" id="{2E14DAB8-E98F-431D-A10B-CEF1578262B5}"/>
               </a:ext>
             </a:extLst>
           </p:cNvPr>
@@ -5313,12 +5543,16 @@
           <a:lstStyle/>
           <a:p>
             <a:r>
+              <a:rPr lang="en-US" dirty="0"/>
+              <a:t>My current </a:t>
+            </a:r>
+            <a:r>
               <a:rPr lang="en-US" dirty="0" err="1"/>
-              <a:t>ASP.Net</a:t>
-            </a:r>
-            <a:r>
-              <a:rPr lang="en-US" dirty="0"/>
-              <a:t> Core</a:t>
+              <a:t>favourite</a:t>
+            </a:r>
+            <a:r>
+              <a:rPr lang="en-US" dirty="0"/>
+              <a:t> architecture</a:t>
             </a:r>
           </a:p>
         </p:txBody>
@@ -5328,7 +5562,7 @@
           <p:cNvPr id="3" name="Content Placeholder 2">
             <a:extLst>
               <a:ext uri="{FF2B5EF4-FFF2-40B4-BE49-F238E27FC236}">
-                <a16:creationId xmlns:a16="http://schemas.microsoft.com/office/drawing/2014/main" id="{DD023737-8E94-45E9-B2D8-EF766F2FA5D5}"/>
+                <a16:creationId xmlns:a16="http://schemas.microsoft.com/office/drawing/2014/main" id="{9E449FEB-B415-4475-BC7C-118FD2AF8F11}"/>
               </a:ext>
             </a:extLst>
           </p:cNvPr>
@@ -5350,7 +5584,15 @@
             </a:pPr>
             <a:r>
               <a:rPr lang="en-US" dirty="0"/>
-              <a:t>Microsoft’s latest web application framework</a:t>
+              <a:t>Define message input/output contracts (</a:t>
+            </a:r>
+            <a:r>
+              <a:rPr lang="en-US" dirty="0" err="1"/>
+              <a:t>viewmodels</a:t>
+            </a:r>
+            <a:r>
+              <a:rPr lang="en-US" dirty="0"/>
+              <a:t>)</a:t>
             </a:r>
           </a:p>
           <a:p>
@@ -5360,7 +5602,15 @@
             </a:pPr>
             <a:r>
               <a:rPr lang="en-US" dirty="0"/>
-              <a:t>Either MVC or just a request handling pipeline</a:t>
+              <a:t>Wrap input/output </a:t>
+            </a:r>
+            <a:r>
+              <a:rPr lang="en-US" dirty="0" err="1"/>
+              <a:t>viewmodels</a:t>
+            </a:r>
+            <a:r>
+              <a:rPr lang="en-US" dirty="0"/>
+              <a:t> with metadata</a:t>
             </a:r>
           </a:p>
           <a:p>
@@ -5370,7 +5620,27 @@
             </a:pPr>
             <a:r>
               <a:rPr lang="en-US" dirty="0"/>
-              <a:t>DI is a first class citizen</a:t>
+              <a:t>Build a message handling pipeline</a:t>
+            </a:r>
+          </a:p>
+          <a:p>
+            <a:pPr marL="742950" lvl="1" indent="-285750">
+              <a:buFont typeface="Arial" panose="020B0604020202020204" pitchFamily="34" charset="0"/>
+              <a:buChar char="•"/>
+            </a:pPr>
+            <a:r>
+              <a:rPr lang="en-US" dirty="0"/>
+              <a:t>Cross-cutting concerns as pipeline stages / behaviors</a:t>
+            </a:r>
+          </a:p>
+          <a:p>
+            <a:pPr marL="742950" lvl="1" indent="-285750">
+              <a:buFont typeface="Arial" panose="020B0604020202020204" pitchFamily="34" charset="0"/>
+              <a:buChar char="•"/>
+            </a:pPr>
+            <a:r>
+              <a:rPr lang="en-US" dirty="0"/>
+              <a:t>Terminal pipeline handlers</a:t>
             </a:r>
           </a:p>
           <a:p>
@@ -5380,7 +5650,17 @@
             </a:pPr>
             <a:r>
               <a:rPr lang="en-US" dirty="0"/>
-              <a:t>Structured logging is built in</a:t>
+              <a:t>Decouple request parsing and response formatting from handling</a:t>
+            </a:r>
+          </a:p>
+          <a:p>
+            <a:pPr marL="742950" lvl="1" indent="-285750">
+              <a:buFont typeface="Arial" panose="020B0604020202020204" pitchFamily="34" charset="0"/>
+              <a:buChar char="•"/>
+            </a:pPr>
+            <a:r>
+              <a:rPr lang="en-US" dirty="0"/>
+              <a:t>Reduce/eliminate handler’s dependency on any framework</a:t>
             </a:r>
           </a:p>
           <a:p>
@@ -5390,8 +5670,21 @@
             </a:pPr>
             <a:r>
               <a:rPr lang="en-US" dirty="0"/>
-              <a:t>Everything is extensible/replaceable</a:t>
-            </a:r>
+              <a:t>Use </a:t>
+            </a:r>
+            <a:r>
+              <a:rPr lang="en-US" dirty="0" err="1"/>
+              <a:t>swashbuckle</a:t>
+            </a:r>
+            <a:r>
+              <a:rPr lang="en-US" dirty="0"/>
+              <a:t> to generate swagger doc/UI from </a:t>
+            </a:r>
+            <a:r>
+              <a:rPr lang="en-US" dirty="0" err="1"/>
+              <a:t>APIExplorer</a:t>
+            </a:r>
+            <a:endParaRPr lang="en-US" dirty="0"/>
           </a:p>
           <a:p>
             <a:pPr marL="285750" indent="-285750">
@@ -5400,7 +5693,17 @@
             </a:pPr>
             <a:r>
               <a:rPr lang="en-US" dirty="0"/>
-              <a:t>Very powerful introspection</a:t>
+              <a:t>Build multiple sets of handlers</a:t>
+            </a:r>
+          </a:p>
+          <a:p>
+            <a:pPr marL="742950" lvl="1" indent="-285750">
+              <a:buFont typeface="Arial" panose="020B0604020202020204" pitchFamily="34" charset="0"/>
+              <a:buChar char="•"/>
+            </a:pPr>
+            <a:r>
+              <a:rPr lang="en-US" dirty="0"/>
+              <a:t>Playground/Mock/Test/Prod</a:t>
             </a:r>
           </a:p>
           <a:p>
@@ -5410,23 +5713,7 @@
             </a:pPr>
             <a:r>
               <a:rPr lang="en-US" dirty="0"/>
-              <a:t>Cross platform on </a:t>
-            </a:r>
-            <a:r>
-              <a:rPr lang="en-US" dirty="0" err="1"/>
-              <a:t>.Net</a:t>
-            </a:r>
-            <a:r>
-              <a:rPr lang="en-US" dirty="0"/>
-              <a:t> Core, Windows only on </a:t>
-            </a:r>
-            <a:r>
-              <a:rPr lang="en-US" dirty="0" err="1"/>
-              <a:t>.Net</a:t>
-            </a:r>
-            <a:r>
-              <a:rPr lang="en-US" dirty="0"/>
-              <a:t> Framework</a:t>
+              <a:t>Use DI framework to swap handlers based on config</a:t>
             </a:r>
           </a:p>
           <a:p>
@@ -5434,20 +5721,14 @@
               <a:buFont typeface="Arial" panose="020B0604020202020204" pitchFamily="34" charset="0"/>
               <a:buChar char="•"/>
             </a:pPr>
-            <a:r>
-              <a:rPr lang="en-US" dirty="0"/>
-              <a:t>Becoming opinionated</a:t>
-            </a:r>
+            <a:endParaRPr lang="en-US" dirty="0"/>
           </a:p>
           <a:p>
             <a:pPr marL="285750" indent="-285750">
               <a:buFont typeface="Arial" panose="020B0604020202020204" pitchFamily="34" charset="0"/>
               <a:buChar char="•"/>
             </a:pPr>
-            <a:r>
-              <a:rPr lang="en-US" dirty="0"/>
-              <a:t>Makes building friendly APIs ridiculously easy</a:t>
-            </a:r>
+            <a:endParaRPr lang="en-US" dirty="0"/>
           </a:p>
           <a:p>
             <a:pPr marL="285750" indent="-285750">
@@ -5461,7 +5742,7 @@
     </p:spTree>
     <p:extLst>
       <p:ext uri="{BB962C8B-B14F-4D97-AF65-F5344CB8AC3E}">
-        <p14:creationId xmlns:p14="http://schemas.microsoft.com/office/powerpoint/2010/main" val="296870125"/>
+        <p14:creationId xmlns:p14="http://schemas.microsoft.com/office/powerpoint/2010/main" val="2769956169"/>
       </p:ext>
     </p:extLst>
   </p:cSld>
@@ -5493,7 +5774,7 @@
           <p:cNvPr id="2" name="Title 1">
             <a:extLst>
               <a:ext uri="{FF2B5EF4-FFF2-40B4-BE49-F238E27FC236}">
-                <a16:creationId xmlns:a16="http://schemas.microsoft.com/office/drawing/2014/main" id="{2CF1641B-6747-4E06-AB97-55124C1CA30C}"/>
+                <a16:creationId xmlns:a16="http://schemas.microsoft.com/office/drawing/2014/main" id="{8CD50955-7322-4A61-9F8E-52926EF73761}"/>
               </a:ext>
             </a:extLst>
           </p:cNvPr>
@@ -5511,9 +5792,12 @@
           <a:p>
             <a:r>
               <a:rPr lang="en-US" dirty="0" err="1"/>
-              <a:t>Mediatr</a:t>
-            </a:r>
-            <a:endParaRPr lang="en-US" dirty="0"/>
+              <a:t>ASP.Net</a:t>
+            </a:r>
+            <a:r>
+              <a:rPr lang="en-US" dirty="0"/>
+              <a:t> Core</a:t>
+            </a:r>
           </a:p>
         </p:txBody>
       </p:sp>
@@ -5522,7 +5806,7 @@
           <p:cNvPr id="3" name="Content Placeholder 2">
             <a:extLst>
               <a:ext uri="{FF2B5EF4-FFF2-40B4-BE49-F238E27FC236}">
-                <a16:creationId xmlns:a16="http://schemas.microsoft.com/office/drawing/2014/main" id="{07EAA702-7A48-4CFD-A878-B636E22E7753}"/>
+                <a16:creationId xmlns:a16="http://schemas.microsoft.com/office/drawing/2014/main" id="{DD023737-8E94-45E9-B2D8-EF766F2FA5D5}"/>
               </a:ext>
             </a:extLst>
           </p:cNvPr>
@@ -5533,14 +5817,11 @@
             <p:ph idx="1"/>
           </p:nvPr>
         </p:nvSpPr>
-        <p:spPr>
-          <a:xfrm>
-            <a:off x="1261872" y="1852864"/>
-            <a:ext cx="8595360" cy="4351337"/>
-          </a:xfrm>
-        </p:spPr>
-        <p:txBody>
-          <a:bodyPr/>
+        <p:spPr/>
+        <p:txBody>
+          <a:bodyPr>
+            <a:normAutofit lnSpcReduction="10000"/>
+          </a:bodyPr>
           <a:lstStyle/>
           <a:p>
             <a:pPr marL="285750" indent="-285750">
@@ -5549,13 +5830,76 @@
             </a:pPr>
             <a:r>
               <a:rPr lang="en-US" dirty="0"/>
-              <a:t>In-process message bus / pipeline for </a:t>
+              <a:t>Microsoft’s latest web application framework</a:t>
+            </a:r>
+          </a:p>
+          <a:p>
+            <a:pPr marL="285750" indent="-285750">
+              <a:buFont typeface="Arial" panose="020B0604020202020204" pitchFamily="34" charset="0"/>
+              <a:buChar char="•"/>
+            </a:pPr>
+            <a:r>
+              <a:rPr lang="en-US" dirty="0"/>
+              <a:t>Either MVC or just a request handling pipeline</a:t>
+            </a:r>
+          </a:p>
+          <a:p>
+            <a:pPr marL="285750" indent="-285750">
+              <a:buFont typeface="Arial" panose="020B0604020202020204" pitchFamily="34" charset="0"/>
+              <a:buChar char="•"/>
+            </a:pPr>
+            <a:r>
+              <a:rPr lang="en-US" dirty="0"/>
+              <a:t>DI is a first class citizen</a:t>
+            </a:r>
+          </a:p>
+          <a:p>
+            <a:pPr marL="285750" indent="-285750">
+              <a:buFont typeface="Arial" panose="020B0604020202020204" pitchFamily="34" charset="0"/>
+              <a:buChar char="•"/>
+            </a:pPr>
+            <a:r>
+              <a:rPr lang="en-US" dirty="0"/>
+              <a:t>Structured logging is built in</a:t>
+            </a:r>
+          </a:p>
+          <a:p>
+            <a:pPr marL="285750" indent="-285750">
+              <a:buFont typeface="Arial" panose="020B0604020202020204" pitchFamily="34" charset="0"/>
+              <a:buChar char="•"/>
+            </a:pPr>
+            <a:r>
+              <a:rPr lang="en-US" dirty="0"/>
+              <a:t>Configuration system built in</a:t>
+            </a:r>
+          </a:p>
+          <a:p>
+            <a:pPr marL="285750" indent="-285750">
+              <a:buFont typeface="Arial" panose="020B0604020202020204" pitchFamily="34" charset="0"/>
+              <a:buChar char="•"/>
+            </a:pPr>
+            <a:r>
+              <a:rPr lang="en-US" dirty="0"/>
+              <a:t>Everything* is extensible/replaceable</a:t>
+            </a:r>
+          </a:p>
+          <a:p>
+            <a:pPr marL="285750" indent="-285750">
+              <a:buFont typeface="Arial" panose="020B0604020202020204" pitchFamily="34" charset="0"/>
+              <a:buChar char="•"/>
+            </a:pPr>
+            <a:r>
+              <a:rPr lang="en-US" dirty="0"/>
+              <a:t>Very powerful introspection (</a:t>
             </a:r>
             <a:r>
               <a:rPr lang="en-US" dirty="0" err="1"/>
-              <a:t>.net</a:t>
-            </a:r>
-            <a:endParaRPr lang="en-US" dirty="0"/>
+              <a:t>APIExplorer</a:t>
+            </a:r>
+            <a:r>
+              <a:rPr lang="en-US" dirty="0"/>
+              <a:t>)</a:t>
+            </a:r>
           </a:p>
           <a:p>
             <a:pPr marL="285750" indent="-285750">
@@ -5564,7 +5908,23 @@
             </a:pPr>
             <a:r>
               <a:rPr lang="en-US" dirty="0"/>
-              <a:t>First-party integration with asp.net core’s DI framework</a:t>
+              <a:t>Cross platform on </a:t>
+            </a:r>
+            <a:r>
+              <a:rPr lang="en-US" dirty="0" err="1"/>
+              <a:t>.Net</a:t>
+            </a:r>
+            <a:r>
+              <a:rPr lang="en-US" dirty="0"/>
+              <a:t> Core, Windows only on </a:t>
+            </a:r>
+            <a:r>
+              <a:rPr lang="en-US" dirty="0" err="1"/>
+              <a:t>.Net</a:t>
+            </a:r>
+            <a:r>
+              <a:rPr lang="en-US" dirty="0"/>
+              <a:t> Framework</a:t>
             </a:r>
           </a:p>
           <a:p>
@@ -5574,12 +5934,24 @@
             </a:pPr>
             <a:r>
               <a:rPr lang="en-US" dirty="0"/>
-              <a:t>Handlers vs </a:t>
-            </a:r>
-            <a:r>
-              <a:rPr lang="en-US" dirty="0" err="1"/>
-              <a:t>Behaviours</a:t>
-            </a:r>
+              <a:t>Becoming opinionated</a:t>
+            </a:r>
+          </a:p>
+          <a:p>
+            <a:pPr marL="285750" indent="-285750">
+              <a:buFont typeface="Arial" panose="020B0604020202020204" pitchFamily="34" charset="0"/>
+              <a:buChar char="•"/>
+            </a:pPr>
+            <a:r>
+              <a:rPr lang="en-US" dirty="0"/>
+              <a:t>Makes building APIs easy, and building good APIs possible</a:t>
+            </a:r>
+          </a:p>
+          <a:p>
+            <a:pPr marL="285750" indent="-285750">
+              <a:buFont typeface="Arial" panose="020B0604020202020204" pitchFamily="34" charset="0"/>
+              <a:buChar char="•"/>
+            </a:pPr>
             <a:endParaRPr lang="en-US" dirty="0"/>
           </a:p>
         </p:txBody>
@@ -5587,7 +5959,7 @@
     </p:spTree>
     <p:extLst>
       <p:ext uri="{BB962C8B-B14F-4D97-AF65-F5344CB8AC3E}">
-        <p14:creationId xmlns:p14="http://schemas.microsoft.com/office/powerpoint/2010/main" val="3380223624"/>
+        <p14:creationId xmlns:p14="http://schemas.microsoft.com/office/powerpoint/2010/main" val="296870125"/>
       </p:ext>
     </p:extLst>
   </p:cSld>
@@ -5619,7 +5991,7 @@
           <p:cNvPr id="2" name="Title 1">
             <a:extLst>
               <a:ext uri="{FF2B5EF4-FFF2-40B4-BE49-F238E27FC236}">
-                <a16:creationId xmlns:a16="http://schemas.microsoft.com/office/drawing/2014/main" id="{1B607BB0-0C1A-40E0-8D20-2DB017818A82}"/>
+                <a16:creationId xmlns:a16="http://schemas.microsoft.com/office/drawing/2014/main" id="{2CF1641B-6747-4E06-AB97-55124C1CA30C}"/>
               </a:ext>
             </a:extLst>
           </p:cNvPr>
@@ -5636,12 +6008,8 @@
           <a:lstStyle/>
           <a:p>
             <a:r>
-              <a:rPr lang="en-US" dirty="0"/>
-              <a:t>Azure </a:t>
-            </a:r>
-            <a:r>
               <a:rPr lang="en-US" dirty="0" err="1"/>
-              <a:t>Devops</a:t>
+              <a:t>Mediatr</a:t>
             </a:r>
             <a:endParaRPr lang="en-US" dirty="0"/>
           </a:p>
@@ -5652,7 +6020,7 @@
           <p:cNvPr id="3" name="Content Placeholder 2">
             <a:extLst>
               <a:ext uri="{FF2B5EF4-FFF2-40B4-BE49-F238E27FC236}">
-                <a16:creationId xmlns:a16="http://schemas.microsoft.com/office/drawing/2014/main" id="{AD0A1F68-4D3F-4DC3-85EF-83971A394C39}"/>
+                <a16:creationId xmlns:a16="http://schemas.microsoft.com/office/drawing/2014/main" id="{07EAA702-7A48-4CFD-A878-B636E22E7753}"/>
               </a:ext>
             </a:extLst>
           </p:cNvPr>
@@ -5663,7 +6031,12 @@
             <p:ph idx="1"/>
           </p:nvPr>
         </p:nvSpPr>
-        <p:spPr/>
+        <p:spPr>
+          <a:xfrm>
+            <a:off x="1261872" y="1852864"/>
+            <a:ext cx="8595360" cy="4351337"/>
+          </a:xfrm>
+        </p:spPr>
         <p:txBody>
           <a:bodyPr/>
           <a:lstStyle/>
@@ -5674,8 +6047,13 @@
             </a:pPr>
             <a:r>
               <a:rPr lang="en-US" dirty="0"/>
-              <a:t>Microsoft’s integrated project management system</a:t>
-            </a:r>
+              <a:t>In-process message bus / pipeline toolkit for </a:t>
+            </a:r>
+            <a:r>
+              <a:rPr lang="en-US" dirty="0" err="1"/>
+              <a:t>.net</a:t>
+            </a:r>
+            <a:endParaRPr lang="en-US" dirty="0"/>
           </a:p>
           <a:p>
             <a:pPr marL="285750" indent="-285750">
@@ -5684,7 +6062,7 @@
             </a:pPr>
             <a:r>
               <a:rPr lang="en-US" dirty="0"/>
-              <a:t>Work tracking and iteration management</a:t>
+              <a:t>First-party integration with asp.net core’s DI framework</a:t>
             </a:r>
           </a:p>
           <a:p>
@@ -5694,45 +6072,20 @@
             </a:pPr>
             <a:r>
               <a:rPr lang="en-US" dirty="0"/>
-              <a:t>Multi-team, multi-component projects</a:t>
-            </a:r>
-          </a:p>
-          <a:p>
-            <a:pPr marL="285750" indent="-285750">
-              <a:buFont typeface="Arial" panose="020B0604020202020204" pitchFamily="34" charset="0"/>
-              <a:buChar char="•"/>
-            </a:pPr>
-            <a:r>
-              <a:rPr lang="en-US" dirty="0"/>
-              <a:t>Source control with massively configurable policies and workflows</a:t>
-            </a:r>
-          </a:p>
-          <a:p>
-            <a:pPr marL="285750" indent="-285750">
-              <a:buFont typeface="Arial" panose="020B0604020202020204" pitchFamily="34" charset="0"/>
-              <a:buChar char="•"/>
-            </a:pPr>
-            <a:r>
-              <a:rPr lang="en-US" dirty="0"/>
-              <a:t>CI/CD pipelines</a:t>
-            </a:r>
-          </a:p>
-          <a:p>
-            <a:pPr marL="285750" indent="-285750">
-              <a:buFont typeface="Arial" panose="020B0604020202020204" pitchFamily="34" charset="0"/>
-              <a:buChar char="•"/>
-            </a:pPr>
-            <a:r>
-              <a:rPr lang="en-US" dirty="0"/>
-              <a:t>Manual integration testing guidance tools</a:t>
-            </a:r>
+              <a:t>Handlers vs </a:t>
+            </a:r>
+            <a:r>
+              <a:rPr lang="en-US" dirty="0" err="1"/>
+              <a:t>Behaviours</a:t>
+            </a:r>
+            <a:endParaRPr lang="en-US" dirty="0"/>
           </a:p>
         </p:txBody>
       </p:sp>
     </p:spTree>
     <p:extLst>
       <p:ext uri="{BB962C8B-B14F-4D97-AF65-F5344CB8AC3E}">
-        <p14:creationId xmlns:p14="http://schemas.microsoft.com/office/powerpoint/2010/main" val="3422881014"/>
+        <p14:creationId xmlns:p14="http://schemas.microsoft.com/office/powerpoint/2010/main" val="3380223624"/>
       </p:ext>
     </p:extLst>
   </p:cSld>
@@ -5764,7 +6117,7 @@
           <p:cNvPr id="2" name="Title 1">
             <a:extLst>
               <a:ext uri="{FF2B5EF4-FFF2-40B4-BE49-F238E27FC236}">
-                <a16:creationId xmlns:a16="http://schemas.microsoft.com/office/drawing/2014/main" id="{0BBD5997-C31F-47EE-BF6B-2123E460D13B}"/>
+                <a16:creationId xmlns:a16="http://schemas.microsoft.com/office/drawing/2014/main" id="{5AE0F6E5-683C-4981-9BD6-3AACA636266F}"/>
               </a:ext>
             </a:extLst>
           </p:cNvPr>
@@ -5780,7 +6133,11 @@
           <a:bodyPr/>
           <a:lstStyle/>
           <a:p>
-            <a:endParaRPr lang="en-US"/>
+            <a:r>
+              <a:rPr lang="en-US" dirty="0" err="1"/>
+              <a:t>Swashbuckle</a:t>
+            </a:r>
+            <a:endParaRPr lang="en-US" dirty="0"/>
           </a:p>
         </p:txBody>
       </p:sp>
@@ -5789,7 +6146,7 @@
           <p:cNvPr id="3" name="Content Placeholder 2">
             <a:extLst>
               <a:ext uri="{FF2B5EF4-FFF2-40B4-BE49-F238E27FC236}">
-                <a16:creationId xmlns:a16="http://schemas.microsoft.com/office/drawing/2014/main" id="{195164A0-F9E2-4976-BCED-72A493B1C7D7}"/>
+                <a16:creationId xmlns:a16="http://schemas.microsoft.com/office/drawing/2014/main" id="{D521BEBE-70DD-4A9F-91C0-6619731E84FF}"/>
               </a:ext>
             </a:extLst>
           </p:cNvPr>
@@ -5805,14 +6162,219 @@
           <a:bodyPr/>
           <a:lstStyle/>
           <a:p>
-            <a:endParaRPr lang="en-US"/>
+            <a:pPr marL="285750" indent="-285750">
+              <a:buFont typeface="Arial" panose="020B0604020202020204" pitchFamily="34" charset="0"/>
+              <a:buChar char="•"/>
+            </a:pPr>
+            <a:r>
+              <a:rPr lang="en-US" dirty="0"/>
+              <a:t>Generates swagger/</a:t>
+            </a:r>
+            <a:r>
+              <a:rPr lang="en-US" dirty="0" err="1"/>
+              <a:t>openAPI</a:t>
+            </a:r>
+            <a:r>
+              <a:rPr lang="en-US" dirty="0"/>
+              <a:t> spec files</a:t>
+            </a:r>
+          </a:p>
+          <a:p>
+            <a:pPr marL="285750" indent="-285750">
+              <a:buFont typeface="Arial" panose="020B0604020202020204" pitchFamily="34" charset="0"/>
+              <a:buChar char="•"/>
+            </a:pPr>
+            <a:r>
+              <a:rPr lang="en-US" dirty="0"/>
+              <a:t>Uses the API introspection system (</a:t>
+            </a:r>
+            <a:r>
+              <a:rPr lang="en-US" dirty="0" err="1"/>
+              <a:t>APIExplorer</a:t>
+            </a:r>
+            <a:r>
+              <a:rPr lang="en-US" dirty="0"/>
+              <a:t>) of asp.net core MVC </a:t>
+            </a:r>
+          </a:p>
+          <a:p>
+            <a:pPr marL="285750" indent="-285750">
+              <a:buFont typeface="Arial" panose="020B0604020202020204" pitchFamily="34" charset="0"/>
+              <a:buChar char="•"/>
+            </a:pPr>
+            <a:r>
+              <a:rPr lang="en-US" dirty="0"/>
+              <a:t>Can include inline/method/class comments in document</a:t>
+            </a:r>
+          </a:p>
+          <a:p>
+            <a:pPr marL="285750" indent="-285750">
+              <a:buFont typeface="Arial" panose="020B0604020202020204" pitchFamily="34" charset="0"/>
+              <a:buChar char="•"/>
+            </a:pPr>
+            <a:r>
+              <a:rPr lang="en-US" dirty="0"/>
+              <a:t>Includes request pipeline to include swagger UI</a:t>
+            </a:r>
+          </a:p>
+          <a:p>
+            <a:pPr marL="285750" indent="-285750">
+              <a:buFont typeface="Arial" panose="020B0604020202020204" pitchFamily="34" charset="0"/>
+              <a:buChar char="•"/>
+            </a:pPr>
+            <a:endParaRPr lang="en-US" dirty="0"/>
           </a:p>
         </p:txBody>
       </p:sp>
     </p:spTree>
     <p:extLst>
       <p:ext uri="{BB962C8B-B14F-4D97-AF65-F5344CB8AC3E}">
-        <p14:creationId xmlns:p14="http://schemas.microsoft.com/office/powerpoint/2010/main" val="3000428590"/>
+        <p14:creationId xmlns:p14="http://schemas.microsoft.com/office/powerpoint/2010/main" val="143007712"/>
+      </p:ext>
+    </p:extLst>
+  </p:cSld>
+  <p:clrMapOvr>
+    <a:masterClrMapping/>
+  </p:clrMapOvr>
+</p:sld>
+</file>
+
+<file path=ppt/slides/slide9.xml><?xml version="1.0" encoding="utf-8"?>
+<p:sld xmlns:a="http://schemas.openxmlformats.org/drawingml/2006/main" xmlns:r="http://schemas.openxmlformats.org/officeDocument/2006/relationships" xmlns:p="http://schemas.openxmlformats.org/presentationml/2006/main">
+  <p:cSld>
+    <p:spTree>
+      <p:nvGrpSpPr>
+        <p:cNvPr id="1" name=""/>
+        <p:cNvGrpSpPr/>
+        <p:nvPr/>
+      </p:nvGrpSpPr>
+      <p:grpSpPr>
+        <a:xfrm>
+          <a:off x="0" y="0"/>
+          <a:ext cx="0" cy="0"/>
+          <a:chOff x="0" y="0"/>
+          <a:chExt cx="0" cy="0"/>
+        </a:xfrm>
+      </p:grpSpPr>
+      <p:sp>
+        <p:nvSpPr>
+          <p:cNvPr id="2" name="Title 1">
+            <a:extLst>
+              <a:ext uri="{FF2B5EF4-FFF2-40B4-BE49-F238E27FC236}">
+                <a16:creationId xmlns:a16="http://schemas.microsoft.com/office/drawing/2014/main" id="{1B607BB0-0C1A-40E0-8D20-2DB017818A82}"/>
+              </a:ext>
+            </a:extLst>
+          </p:cNvPr>
+          <p:cNvSpPr>
+            <a:spLocks noGrp="1"/>
+          </p:cNvSpPr>
+          <p:nvPr>
+            <p:ph type="title"/>
+          </p:nvPr>
+        </p:nvSpPr>
+        <p:spPr/>
+        <p:txBody>
+          <a:bodyPr/>
+          <a:lstStyle/>
+          <a:p>
+            <a:r>
+              <a:rPr lang="en-US" dirty="0"/>
+              <a:t>Azure </a:t>
+            </a:r>
+            <a:r>
+              <a:rPr lang="en-US" dirty="0" err="1"/>
+              <a:t>Devops</a:t>
+            </a:r>
+            <a:endParaRPr lang="en-US" dirty="0"/>
+          </a:p>
+        </p:txBody>
+      </p:sp>
+      <p:sp>
+        <p:nvSpPr>
+          <p:cNvPr id="3" name="Content Placeholder 2">
+            <a:extLst>
+              <a:ext uri="{FF2B5EF4-FFF2-40B4-BE49-F238E27FC236}">
+                <a16:creationId xmlns:a16="http://schemas.microsoft.com/office/drawing/2014/main" id="{AD0A1F68-4D3F-4DC3-85EF-83971A394C39}"/>
+              </a:ext>
+            </a:extLst>
+          </p:cNvPr>
+          <p:cNvSpPr>
+            <a:spLocks noGrp="1"/>
+          </p:cNvSpPr>
+          <p:nvPr>
+            <p:ph idx="1"/>
+          </p:nvPr>
+        </p:nvSpPr>
+        <p:spPr/>
+        <p:txBody>
+          <a:bodyPr/>
+          <a:lstStyle/>
+          <a:p>
+            <a:pPr marL="285750" indent="-285750">
+              <a:buFont typeface="Arial" panose="020B0604020202020204" pitchFamily="34" charset="0"/>
+              <a:buChar char="•"/>
+            </a:pPr>
+            <a:r>
+              <a:rPr lang="en-US" dirty="0"/>
+              <a:t>Microsoft’s integrated project management system</a:t>
+            </a:r>
+          </a:p>
+          <a:p>
+            <a:pPr marL="285750" indent="-285750">
+              <a:buFont typeface="Arial" panose="020B0604020202020204" pitchFamily="34" charset="0"/>
+              <a:buChar char="•"/>
+            </a:pPr>
+            <a:r>
+              <a:rPr lang="en-US" dirty="0"/>
+              <a:t>Work tracking and iteration management</a:t>
+            </a:r>
+          </a:p>
+          <a:p>
+            <a:pPr marL="285750" indent="-285750">
+              <a:buFont typeface="Arial" panose="020B0604020202020204" pitchFamily="34" charset="0"/>
+              <a:buChar char="•"/>
+            </a:pPr>
+            <a:r>
+              <a:rPr lang="en-US" dirty="0"/>
+              <a:t>Multi-team, multi-component projects</a:t>
+            </a:r>
+          </a:p>
+          <a:p>
+            <a:pPr marL="285750" indent="-285750">
+              <a:buFont typeface="Arial" panose="020B0604020202020204" pitchFamily="34" charset="0"/>
+              <a:buChar char="•"/>
+            </a:pPr>
+            <a:r>
+              <a:rPr lang="en-US" dirty="0"/>
+              <a:t>Source control with massively configurable policies and workflows</a:t>
+            </a:r>
+          </a:p>
+          <a:p>
+            <a:pPr marL="285750" indent="-285750">
+              <a:buFont typeface="Arial" panose="020B0604020202020204" pitchFamily="34" charset="0"/>
+              <a:buChar char="•"/>
+            </a:pPr>
+            <a:r>
+              <a:rPr lang="en-US" dirty="0"/>
+              <a:t>CI/CD pipelines</a:t>
+            </a:r>
+          </a:p>
+          <a:p>
+            <a:pPr marL="285750" indent="-285750">
+              <a:buFont typeface="Arial" panose="020B0604020202020204" pitchFamily="34" charset="0"/>
+              <a:buChar char="•"/>
+            </a:pPr>
+            <a:r>
+              <a:rPr lang="en-US" dirty="0"/>
+              <a:t>Manual integration testing guidance tools</a:t>
+            </a:r>
+          </a:p>
+        </p:txBody>
+      </p:sp>
+    </p:spTree>
+    <p:extLst>
+      <p:ext uri="{BB962C8B-B14F-4D97-AF65-F5344CB8AC3E}">
+        <p14:creationId xmlns:p14="http://schemas.microsoft.com/office/powerpoint/2010/main" val="3422881014"/>
       </p:ext>
     </p:extLst>
   </p:cSld>

</xml_diff>